<commit_message>
[hw02] Completed simple and medium baseline
</commit_message>
<xml_diff>
--- a/hw02.pptx
+++ b/hw02.pptx
@@ -4,8 +4,18 @@
   <p:sldMasterIdLst>
     <p:sldMasterId id="2147483648" r:id="rId1"/>
   </p:sldMasterIdLst>
+  <p:notesMasterIdLst>
+    <p:notesMasterId r:id="rId10"/>
+  </p:notesMasterIdLst>
   <p:sldIdLst>
-    <p:sldId id="256" r:id="rId2"/>
+    <p:sldId id="258" r:id="rId2"/>
+    <p:sldId id="259" r:id="rId3"/>
+    <p:sldId id="260" r:id="rId4"/>
+    <p:sldId id="261" r:id="rId5"/>
+    <p:sldId id="262" r:id="rId6"/>
+    <p:sldId id="263" r:id="rId7"/>
+    <p:sldId id="264" r:id="rId8"/>
+    <p:sldId id="265" r:id="rId9"/>
   </p:sldIdLst>
   <p:sldSz cx="12192000" cy="6858000"/>
   <p:notesSz cx="6858000" cy="9144000"/>
@@ -104,7 +114,1103 @@
       </a:defRPr>
     </a:lvl9pPr>
   </p:defaultTextStyle>
+  <p:extLst>
+    <p:ext uri="{EFAFB233-063F-42B5-8137-9DF3F51BA10A}">
+      <p15:sldGuideLst xmlns:p15="http://schemas.microsoft.com/office/powerpoint/2012/main"/>
+    </p:ext>
+  </p:extLst>
 </p:presentation>
+</file>
+
+<file path=ppt/notesMasters/notesMaster1.xml><?xml version="1.0" encoding="utf-8"?>
+<p:notesMaster xmlns:a="http://schemas.openxmlformats.org/drawingml/2006/main" xmlns:r="http://schemas.openxmlformats.org/officeDocument/2006/relationships" xmlns:p="http://schemas.openxmlformats.org/presentationml/2006/main">
+  <p:cSld>
+    <p:bg>
+      <p:bgRef idx="1001">
+        <a:schemeClr val="bg1"/>
+      </p:bgRef>
+    </p:bg>
+    <p:spTree>
+      <p:nvGrpSpPr>
+        <p:cNvPr id="1" name=""/>
+        <p:cNvGrpSpPr/>
+        <p:nvPr/>
+      </p:nvGrpSpPr>
+      <p:grpSpPr>
+        <a:xfrm>
+          <a:off x="0" y="0"/>
+          <a:ext cx="0" cy="0"/>
+          <a:chOff x="0" y="0"/>
+          <a:chExt cx="0" cy="0"/>
+        </a:xfrm>
+      </p:grpSpPr>
+      <p:sp>
+        <p:nvSpPr>
+          <p:cNvPr id="2" name="頁首版面配置區 1"/>
+          <p:cNvSpPr>
+            <a:spLocks noGrp="1"/>
+          </p:cNvSpPr>
+          <p:nvPr>
+            <p:ph type="hdr" sz="quarter"/>
+          </p:nvPr>
+        </p:nvSpPr>
+        <p:spPr>
+          <a:xfrm>
+            <a:off x="0" y="0"/>
+            <a:ext cx="2971800" cy="458788"/>
+          </a:xfrm>
+          <a:prstGeom prst="rect">
+            <a:avLst/>
+          </a:prstGeom>
+        </p:spPr>
+        <p:txBody>
+          <a:bodyPr vert="horz" lIns="91440" tIns="45720" rIns="91440" bIns="45720" rtlCol="0"/>
+          <a:lstStyle>
+            <a:lvl1pPr algn="l">
+              <a:defRPr sz="1200"/>
+            </a:lvl1pPr>
+          </a:lstStyle>
+          <a:p>
+            <a:endParaRPr lang="zh-TW" altLang="en-US"/>
+          </a:p>
+        </p:txBody>
+      </p:sp>
+      <p:sp>
+        <p:nvSpPr>
+          <p:cNvPr id="3" name="日期版面配置區 2"/>
+          <p:cNvSpPr>
+            <a:spLocks noGrp="1"/>
+          </p:cNvSpPr>
+          <p:nvPr>
+            <p:ph type="dt" idx="1"/>
+          </p:nvPr>
+        </p:nvSpPr>
+        <p:spPr>
+          <a:xfrm>
+            <a:off x="3884613" y="0"/>
+            <a:ext cx="2971800" cy="458788"/>
+          </a:xfrm>
+          <a:prstGeom prst="rect">
+            <a:avLst/>
+          </a:prstGeom>
+        </p:spPr>
+        <p:txBody>
+          <a:bodyPr vert="horz" lIns="91440" tIns="45720" rIns="91440" bIns="45720" rtlCol="0"/>
+          <a:lstStyle>
+            <a:lvl1pPr algn="r">
+              <a:defRPr sz="1200"/>
+            </a:lvl1pPr>
+          </a:lstStyle>
+          <a:p>
+            <a:fld id="{FF667865-6DE5-4796-86DC-687F74677F04}" type="datetimeFigureOut">
+              <a:rPr lang="zh-TW" altLang="en-US" smtClean="0"/>
+              <a:t>2024/10/26</a:t>
+            </a:fld>
+            <a:endParaRPr lang="zh-TW" altLang="en-US"/>
+          </a:p>
+        </p:txBody>
+      </p:sp>
+      <p:sp>
+        <p:nvSpPr>
+          <p:cNvPr id="4" name="投影片影像版面配置區 3"/>
+          <p:cNvSpPr>
+            <a:spLocks noGrp="1" noRot="1" noChangeAspect="1"/>
+          </p:cNvSpPr>
+          <p:nvPr>
+            <p:ph type="sldImg" idx="2"/>
+          </p:nvPr>
+        </p:nvSpPr>
+        <p:spPr>
+          <a:xfrm>
+            <a:off x="685800" y="1143000"/>
+            <a:ext cx="5486400" cy="3086100"/>
+          </a:xfrm>
+          <a:prstGeom prst="rect">
+            <a:avLst/>
+          </a:prstGeom>
+          <a:noFill/>
+          <a:ln w="12700">
+            <a:solidFill>
+              <a:prstClr val="black"/>
+            </a:solidFill>
+          </a:ln>
+        </p:spPr>
+        <p:txBody>
+          <a:bodyPr vert="horz" lIns="91440" tIns="45720" rIns="91440" bIns="45720" rtlCol="0" anchor="ctr"/>
+          <a:lstStyle/>
+          <a:p>
+            <a:endParaRPr lang="zh-TW" altLang="en-US"/>
+          </a:p>
+        </p:txBody>
+      </p:sp>
+      <p:sp>
+        <p:nvSpPr>
+          <p:cNvPr id="5" name="備忘稿版面配置區 4"/>
+          <p:cNvSpPr>
+            <a:spLocks noGrp="1"/>
+          </p:cNvSpPr>
+          <p:nvPr>
+            <p:ph type="body" sz="quarter" idx="3"/>
+          </p:nvPr>
+        </p:nvSpPr>
+        <p:spPr>
+          <a:xfrm>
+            <a:off x="685800" y="4400550"/>
+            <a:ext cx="5486400" cy="3600450"/>
+          </a:xfrm>
+          <a:prstGeom prst="rect">
+            <a:avLst/>
+          </a:prstGeom>
+        </p:spPr>
+        <p:txBody>
+          <a:bodyPr vert="horz" lIns="91440" tIns="45720" rIns="91440" bIns="45720" rtlCol="0"/>
+          <a:lstStyle/>
+          <a:p>
+            <a:pPr lvl="0"/>
+            <a:r>
+              <a:rPr lang="zh-TW" altLang="en-US"/>
+              <a:t>按一下以編輯母片文字樣式</a:t>
+            </a:r>
+          </a:p>
+          <a:p>
+            <a:pPr lvl="1"/>
+            <a:r>
+              <a:rPr lang="zh-TW" altLang="en-US"/>
+              <a:t>第二層</a:t>
+            </a:r>
+          </a:p>
+          <a:p>
+            <a:pPr lvl="2"/>
+            <a:r>
+              <a:rPr lang="zh-TW" altLang="en-US"/>
+              <a:t>第三層</a:t>
+            </a:r>
+          </a:p>
+          <a:p>
+            <a:pPr lvl="3"/>
+            <a:r>
+              <a:rPr lang="zh-TW" altLang="en-US"/>
+              <a:t>第四層</a:t>
+            </a:r>
+          </a:p>
+          <a:p>
+            <a:pPr lvl="4"/>
+            <a:r>
+              <a:rPr lang="zh-TW" altLang="en-US"/>
+              <a:t>第五層</a:t>
+            </a:r>
+          </a:p>
+        </p:txBody>
+      </p:sp>
+      <p:sp>
+        <p:nvSpPr>
+          <p:cNvPr id="6" name="頁尾版面配置區 5"/>
+          <p:cNvSpPr>
+            <a:spLocks noGrp="1"/>
+          </p:cNvSpPr>
+          <p:nvPr>
+            <p:ph type="ftr" sz="quarter" idx="4"/>
+          </p:nvPr>
+        </p:nvSpPr>
+        <p:spPr>
+          <a:xfrm>
+            <a:off x="0" y="8685213"/>
+            <a:ext cx="2971800" cy="458787"/>
+          </a:xfrm>
+          <a:prstGeom prst="rect">
+            <a:avLst/>
+          </a:prstGeom>
+        </p:spPr>
+        <p:txBody>
+          <a:bodyPr vert="horz" lIns="91440" tIns="45720" rIns="91440" bIns="45720" rtlCol="0" anchor="b"/>
+          <a:lstStyle>
+            <a:lvl1pPr algn="l">
+              <a:defRPr sz="1200"/>
+            </a:lvl1pPr>
+          </a:lstStyle>
+          <a:p>
+            <a:endParaRPr lang="zh-TW" altLang="en-US"/>
+          </a:p>
+        </p:txBody>
+      </p:sp>
+      <p:sp>
+        <p:nvSpPr>
+          <p:cNvPr id="7" name="投影片編號版面配置區 6"/>
+          <p:cNvSpPr>
+            <a:spLocks noGrp="1"/>
+          </p:cNvSpPr>
+          <p:nvPr>
+            <p:ph type="sldNum" sz="quarter" idx="5"/>
+          </p:nvPr>
+        </p:nvSpPr>
+        <p:spPr>
+          <a:xfrm>
+            <a:off x="3884613" y="8685213"/>
+            <a:ext cx="2971800" cy="458787"/>
+          </a:xfrm>
+          <a:prstGeom prst="rect">
+            <a:avLst/>
+          </a:prstGeom>
+        </p:spPr>
+        <p:txBody>
+          <a:bodyPr vert="horz" lIns="91440" tIns="45720" rIns="91440" bIns="45720" rtlCol="0" anchor="b"/>
+          <a:lstStyle>
+            <a:lvl1pPr algn="r">
+              <a:defRPr sz="1200"/>
+            </a:lvl1pPr>
+          </a:lstStyle>
+          <a:p>
+            <a:fld id="{6E3DB6C8-F213-43E3-857E-F7BDCA39C294}" type="slidenum">
+              <a:rPr lang="zh-TW" altLang="en-US" smtClean="0"/>
+              <a:t>‹#›</a:t>
+            </a:fld>
+            <a:endParaRPr lang="zh-TW" altLang="en-US"/>
+          </a:p>
+        </p:txBody>
+      </p:sp>
+    </p:spTree>
+    <p:extLst>
+      <p:ext uri="{BB962C8B-B14F-4D97-AF65-F5344CB8AC3E}">
+        <p14:creationId xmlns:p14="http://schemas.microsoft.com/office/powerpoint/2010/main" val="3534136224"/>
+      </p:ext>
+    </p:extLst>
+  </p:cSld>
+  <p:clrMap bg1="lt1" tx1="dk1" bg2="lt2" tx2="dk2" accent1="accent1" accent2="accent2" accent3="accent3" accent4="accent4" accent5="accent5" accent6="accent6" hlink="hlink" folHlink="folHlink"/>
+  <p:notesStyle>
+    <a:lvl1pPr marL="0" algn="l" defTabSz="914400" rtl="0" eaLnBrk="1" latinLnBrk="0" hangingPunct="1">
+      <a:defRPr sz="1200" kern="1200">
+        <a:solidFill>
+          <a:schemeClr val="tx1"/>
+        </a:solidFill>
+        <a:latin typeface="+mn-lt"/>
+        <a:ea typeface="+mn-ea"/>
+        <a:cs typeface="+mn-cs"/>
+      </a:defRPr>
+    </a:lvl1pPr>
+    <a:lvl2pPr marL="457200" algn="l" defTabSz="914400" rtl="0" eaLnBrk="1" latinLnBrk="0" hangingPunct="1">
+      <a:defRPr sz="1200" kern="1200">
+        <a:solidFill>
+          <a:schemeClr val="tx1"/>
+        </a:solidFill>
+        <a:latin typeface="+mn-lt"/>
+        <a:ea typeface="+mn-ea"/>
+        <a:cs typeface="+mn-cs"/>
+      </a:defRPr>
+    </a:lvl2pPr>
+    <a:lvl3pPr marL="914400" algn="l" defTabSz="914400" rtl="0" eaLnBrk="1" latinLnBrk="0" hangingPunct="1">
+      <a:defRPr sz="1200" kern="1200">
+        <a:solidFill>
+          <a:schemeClr val="tx1"/>
+        </a:solidFill>
+        <a:latin typeface="+mn-lt"/>
+        <a:ea typeface="+mn-ea"/>
+        <a:cs typeface="+mn-cs"/>
+      </a:defRPr>
+    </a:lvl3pPr>
+    <a:lvl4pPr marL="1371600" algn="l" defTabSz="914400" rtl="0" eaLnBrk="1" latinLnBrk="0" hangingPunct="1">
+      <a:defRPr sz="1200" kern="1200">
+        <a:solidFill>
+          <a:schemeClr val="tx1"/>
+        </a:solidFill>
+        <a:latin typeface="+mn-lt"/>
+        <a:ea typeface="+mn-ea"/>
+        <a:cs typeface="+mn-cs"/>
+      </a:defRPr>
+    </a:lvl4pPr>
+    <a:lvl5pPr marL="1828800" algn="l" defTabSz="914400" rtl="0" eaLnBrk="1" latinLnBrk="0" hangingPunct="1">
+      <a:defRPr sz="1200" kern="1200">
+        <a:solidFill>
+          <a:schemeClr val="tx1"/>
+        </a:solidFill>
+        <a:latin typeface="+mn-lt"/>
+        <a:ea typeface="+mn-ea"/>
+        <a:cs typeface="+mn-cs"/>
+      </a:defRPr>
+    </a:lvl5pPr>
+    <a:lvl6pPr marL="2286000" algn="l" defTabSz="914400" rtl="0" eaLnBrk="1" latinLnBrk="0" hangingPunct="1">
+      <a:defRPr sz="1200" kern="1200">
+        <a:solidFill>
+          <a:schemeClr val="tx1"/>
+        </a:solidFill>
+        <a:latin typeface="+mn-lt"/>
+        <a:ea typeface="+mn-ea"/>
+        <a:cs typeface="+mn-cs"/>
+      </a:defRPr>
+    </a:lvl6pPr>
+    <a:lvl7pPr marL="2743200" algn="l" defTabSz="914400" rtl="0" eaLnBrk="1" latinLnBrk="0" hangingPunct="1">
+      <a:defRPr sz="1200" kern="1200">
+        <a:solidFill>
+          <a:schemeClr val="tx1"/>
+        </a:solidFill>
+        <a:latin typeface="+mn-lt"/>
+        <a:ea typeface="+mn-ea"/>
+        <a:cs typeface="+mn-cs"/>
+      </a:defRPr>
+    </a:lvl7pPr>
+    <a:lvl8pPr marL="3200400" algn="l" defTabSz="914400" rtl="0" eaLnBrk="1" latinLnBrk="0" hangingPunct="1">
+      <a:defRPr sz="1200" kern="1200">
+        <a:solidFill>
+          <a:schemeClr val="tx1"/>
+        </a:solidFill>
+        <a:latin typeface="+mn-lt"/>
+        <a:ea typeface="+mn-ea"/>
+        <a:cs typeface="+mn-cs"/>
+      </a:defRPr>
+    </a:lvl8pPr>
+    <a:lvl9pPr marL="3657600" algn="l" defTabSz="914400" rtl="0" eaLnBrk="1" latinLnBrk="0" hangingPunct="1">
+      <a:defRPr sz="1200" kern="1200">
+        <a:solidFill>
+          <a:schemeClr val="tx1"/>
+        </a:solidFill>
+        <a:latin typeface="+mn-lt"/>
+        <a:ea typeface="+mn-ea"/>
+        <a:cs typeface="+mn-cs"/>
+      </a:defRPr>
+    </a:lvl9pPr>
+  </p:notesStyle>
+</p:notesMaster>
+</file>
+
+<file path=ppt/notesSlides/notesSlide1.xml><?xml version="1.0" encoding="utf-8"?>
+<p:notes xmlns:a="http://schemas.openxmlformats.org/drawingml/2006/main" xmlns:r="http://schemas.openxmlformats.org/officeDocument/2006/relationships" xmlns:p="http://schemas.openxmlformats.org/presentationml/2006/main">
+  <p:cSld>
+    <p:spTree>
+      <p:nvGrpSpPr>
+        <p:cNvPr id="1" name=""/>
+        <p:cNvGrpSpPr/>
+        <p:nvPr/>
+      </p:nvGrpSpPr>
+      <p:grpSpPr>
+        <a:xfrm>
+          <a:off x="0" y="0"/>
+          <a:ext cx="0" cy="0"/>
+          <a:chOff x="0" y="0"/>
+          <a:chExt cx="0" cy="0"/>
+        </a:xfrm>
+      </p:grpSpPr>
+      <p:sp>
+        <p:nvSpPr>
+          <p:cNvPr id="2" name="投影片影像版面配置區 1"/>
+          <p:cNvSpPr>
+            <a:spLocks noGrp="1" noRot="1" noChangeAspect="1"/>
+          </p:cNvSpPr>
+          <p:nvPr>
+            <p:ph type="sldImg"/>
+          </p:nvPr>
+        </p:nvSpPr>
+        <p:spPr/>
+      </p:sp>
+      <p:sp>
+        <p:nvSpPr>
+          <p:cNvPr id="3" name="備忘稿版面配置區 2"/>
+          <p:cNvSpPr>
+            <a:spLocks noGrp="1"/>
+          </p:cNvSpPr>
+          <p:nvPr>
+            <p:ph type="body" idx="1"/>
+          </p:nvPr>
+        </p:nvSpPr>
+        <p:spPr/>
+        <p:txBody>
+          <a:bodyPr/>
+          <a:lstStyle/>
+          <a:p>
+            <a:endParaRPr lang="zh-TW" altLang="en-US" dirty="0"/>
+          </a:p>
+        </p:txBody>
+      </p:sp>
+      <p:sp>
+        <p:nvSpPr>
+          <p:cNvPr id="4" name="投影片編號版面配置區 3"/>
+          <p:cNvSpPr>
+            <a:spLocks noGrp="1"/>
+          </p:cNvSpPr>
+          <p:nvPr>
+            <p:ph type="sldNum" sz="quarter" idx="5"/>
+          </p:nvPr>
+        </p:nvSpPr>
+        <p:spPr/>
+        <p:txBody>
+          <a:bodyPr/>
+          <a:lstStyle/>
+          <a:p>
+            <a:fld id="{6E3DB6C8-F213-43E3-857E-F7BDCA39C294}" type="slidenum">
+              <a:rPr lang="zh-TW" altLang="en-US" smtClean="0"/>
+              <a:t>1</a:t>
+            </a:fld>
+            <a:endParaRPr lang="zh-TW" altLang="en-US"/>
+          </a:p>
+        </p:txBody>
+      </p:sp>
+    </p:spTree>
+    <p:extLst>
+      <p:ext uri="{BB962C8B-B14F-4D97-AF65-F5344CB8AC3E}">
+        <p14:creationId xmlns:p14="http://schemas.microsoft.com/office/powerpoint/2010/main" val="4226009892"/>
+      </p:ext>
+    </p:extLst>
+  </p:cSld>
+  <p:clrMapOvr>
+    <a:masterClrMapping/>
+  </p:clrMapOvr>
+</p:notes>
+</file>
+
+<file path=ppt/notesSlides/notesSlide2.xml><?xml version="1.0" encoding="utf-8"?>
+<p:notes xmlns:a="http://schemas.openxmlformats.org/drawingml/2006/main" xmlns:r="http://schemas.openxmlformats.org/officeDocument/2006/relationships" xmlns:p="http://schemas.openxmlformats.org/presentationml/2006/main">
+  <p:cSld>
+    <p:spTree>
+      <p:nvGrpSpPr>
+        <p:cNvPr id="1" name=""/>
+        <p:cNvGrpSpPr/>
+        <p:nvPr/>
+      </p:nvGrpSpPr>
+      <p:grpSpPr>
+        <a:xfrm>
+          <a:off x="0" y="0"/>
+          <a:ext cx="0" cy="0"/>
+          <a:chOff x="0" y="0"/>
+          <a:chExt cx="0" cy="0"/>
+        </a:xfrm>
+      </p:grpSpPr>
+      <p:sp>
+        <p:nvSpPr>
+          <p:cNvPr id="2" name="投影片影像版面配置區 1"/>
+          <p:cNvSpPr>
+            <a:spLocks noGrp="1" noRot="1" noChangeAspect="1"/>
+          </p:cNvSpPr>
+          <p:nvPr>
+            <p:ph type="sldImg"/>
+          </p:nvPr>
+        </p:nvSpPr>
+        <p:spPr/>
+      </p:sp>
+      <p:sp>
+        <p:nvSpPr>
+          <p:cNvPr id="3" name="備忘稿版面配置區 2"/>
+          <p:cNvSpPr>
+            <a:spLocks noGrp="1"/>
+          </p:cNvSpPr>
+          <p:nvPr>
+            <p:ph type="body" idx="1"/>
+          </p:nvPr>
+        </p:nvSpPr>
+        <p:spPr/>
+        <p:txBody>
+          <a:bodyPr/>
+          <a:lstStyle/>
+          <a:p>
+            <a:r>
+              <a:rPr lang="en-US" altLang="zh-TW" b="1" i="0" dirty="0">
+                <a:solidFill>
+                  <a:srgbClr val="242424"/>
+                </a:solidFill>
+                <a:effectLst/>
+                <a:latin typeface="Segoe UI" panose="020B0502040204020203" pitchFamily="34" charset="0"/>
+              </a:rPr>
+              <a:t>A young anime-style girl with a darker art style, gray skin, and silver-gray hair. The hair on the back of her head is short, with two strands much longer than the rest, hanging down to her chest. Her bangs cover one of her deep purple eyes, with no light spots in the pupils, creating an intense and mysterious gaze. Her entire skin is gray, with no flesh color. She has elf-like ears. She wears a purple gemstone on her chest. Her overall look exudes a melancholic and mysterious aura. She is dressed in black Gothic clothing with an oversized white sports jacket, half-zipped, and wears a black beret with ribbon decorations. The background is an alley, and she is looking back. The drawing should not be too realistic, more like a manga character.</a:t>
+            </a:r>
+            <a:endParaRPr lang="zh-TW" altLang="en-US" dirty="0"/>
+          </a:p>
+        </p:txBody>
+      </p:sp>
+      <p:sp>
+        <p:nvSpPr>
+          <p:cNvPr id="4" name="投影片編號版面配置區 3"/>
+          <p:cNvSpPr>
+            <a:spLocks noGrp="1"/>
+          </p:cNvSpPr>
+          <p:nvPr>
+            <p:ph type="sldNum" sz="quarter" idx="5"/>
+          </p:nvPr>
+        </p:nvSpPr>
+        <p:spPr/>
+        <p:txBody>
+          <a:bodyPr/>
+          <a:lstStyle/>
+          <a:p>
+            <a:fld id="{6E3DB6C8-F213-43E3-857E-F7BDCA39C294}" type="slidenum">
+              <a:rPr lang="zh-TW" altLang="en-US" smtClean="0"/>
+              <a:t>2</a:t>
+            </a:fld>
+            <a:endParaRPr lang="zh-TW" altLang="en-US"/>
+          </a:p>
+        </p:txBody>
+      </p:sp>
+    </p:spTree>
+    <p:extLst>
+      <p:ext uri="{BB962C8B-B14F-4D97-AF65-F5344CB8AC3E}">
+        <p14:creationId xmlns:p14="http://schemas.microsoft.com/office/powerpoint/2010/main" val="1127428831"/>
+      </p:ext>
+    </p:extLst>
+  </p:cSld>
+  <p:clrMapOvr>
+    <a:masterClrMapping/>
+  </p:clrMapOvr>
+</p:notes>
+</file>
+
+<file path=ppt/notesSlides/notesSlide3.xml><?xml version="1.0" encoding="utf-8"?>
+<p:notes xmlns:a="http://schemas.openxmlformats.org/drawingml/2006/main" xmlns:r="http://schemas.openxmlformats.org/officeDocument/2006/relationships" xmlns:p="http://schemas.openxmlformats.org/presentationml/2006/main">
+  <p:cSld>
+    <p:spTree>
+      <p:nvGrpSpPr>
+        <p:cNvPr id="1" name=""/>
+        <p:cNvGrpSpPr/>
+        <p:nvPr/>
+      </p:nvGrpSpPr>
+      <p:grpSpPr>
+        <a:xfrm>
+          <a:off x="0" y="0"/>
+          <a:ext cx="0" cy="0"/>
+          <a:chOff x="0" y="0"/>
+          <a:chExt cx="0" cy="0"/>
+        </a:xfrm>
+      </p:grpSpPr>
+      <p:sp>
+        <p:nvSpPr>
+          <p:cNvPr id="2" name="投影片影像版面配置區 1"/>
+          <p:cNvSpPr>
+            <a:spLocks noGrp="1" noRot="1" noChangeAspect="1"/>
+          </p:cNvSpPr>
+          <p:nvPr>
+            <p:ph type="sldImg"/>
+          </p:nvPr>
+        </p:nvSpPr>
+        <p:spPr/>
+      </p:sp>
+      <p:sp>
+        <p:nvSpPr>
+          <p:cNvPr id="3" name="備忘稿版面配置區 2"/>
+          <p:cNvSpPr>
+            <a:spLocks noGrp="1"/>
+          </p:cNvSpPr>
+          <p:nvPr>
+            <p:ph type="body" idx="1"/>
+          </p:nvPr>
+        </p:nvSpPr>
+        <p:spPr/>
+        <p:txBody>
+          <a:bodyPr/>
+          <a:lstStyle/>
+          <a:p>
+            <a:r>
+              <a:rPr lang="en-US" altLang="zh-TW" b="1" i="0" dirty="0">
+                <a:solidFill>
+                  <a:srgbClr val="242424"/>
+                </a:solidFill>
+                <a:effectLst/>
+                <a:latin typeface="Segoe UI" panose="020B0502040204020203" pitchFamily="34" charset="0"/>
+              </a:rPr>
+              <a:t>A young girl in Japanese anime style with a dark theme, gray skin, and silver-gray hair. The hair at the back of her head is short, with two strands much longer than the rest, hanging down to her chest. Her bangs cover one of her deep purple eyes, with no light in the pupils, creating an intense and mysterious gaze. Her entire skin is gray, with no flesh color. She has elf-like ears. There is a purple gem on her chest. Her overall appearance exudes a melancholic and mysterious aura. She is wearing black Gothic clothing and a white oversized sports jacket, with the zipper only halfway up, and a black beret with ribbon decorations. The background is nighttime, showing the girl's side face, meaning not to show the front of her face, with her looking to the left, walking on the street. The style should not be too realistic, more like a comic character.</a:t>
+            </a:r>
+            <a:endParaRPr lang="zh-TW" altLang="en-US" dirty="0"/>
+          </a:p>
+        </p:txBody>
+      </p:sp>
+      <p:sp>
+        <p:nvSpPr>
+          <p:cNvPr id="4" name="投影片編號版面配置區 3"/>
+          <p:cNvSpPr>
+            <a:spLocks noGrp="1"/>
+          </p:cNvSpPr>
+          <p:nvPr>
+            <p:ph type="sldNum" sz="quarter" idx="5"/>
+          </p:nvPr>
+        </p:nvSpPr>
+        <p:spPr/>
+        <p:txBody>
+          <a:bodyPr/>
+          <a:lstStyle/>
+          <a:p>
+            <a:fld id="{6E3DB6C8-F213-43E3-857E-F7BDCA39C294}" type="slidenum">
+              <a:rPr lang="zh-TW" altLang="en-US" smtClean="0"/>
+              <a:t>3</a:t>
+            </a:fld>
+            <a:endParaRPr lang="zh-TW" altLang="en-US"/>
+          </a:p>
+        </p:txBody>
+      </p:sp>
+    </p:spTree>
+    <p:extLst>
+      <p:ext uri="{BB962C8B-B14F-4D97-AF65-F5344CB8AC3E}">
+        <p14:creationId xmlns:p14="http://schemas.microsoft.com/office/powerpoint/2010/main" val="1525745318"/>
+      </p:ext>
+    </p:extLst>
+  </p:cSld>
+  <p:clrMapOvr>
+    <a:masterClrMapping/>
+  </p:clrMapOvr>
+</p:notes>
+</file>
+
+<file path=ppt/notesSlides/notesSlide4.xml><?xml version="1.0" encoding="utf-8"?>
+<p:notes xmlns:a="http://schemas.openxmlformats.org/drawingml/2006/main" xmlns:r="http://schemas.openxmlformats.org/officeDocument/2006/relationships" xmlns:p="http://schemas.openxmlformats.org/presentationml/2006/main">
+  <p:cSld>
+    <p:spTree>
+      <p:nvGrpSpPr>
+        <p:cNvPr id="1" name=""/>
+        <p:cNvGrpSpPr/>
+        <p:nvPr/>
+      </p:nvGrpSpPr>
+      <p:grpSpPr>
+        <a:xfrm>
+          <a:off x="0" y="0"/>
+          <a:ext cx="0" cy="0"/>
+          <a:chOff x="0" y="0"/>
+          <a:chExt cx="0" cy="0"/>
+        </a:xfrm>
+      </p:grpSpPr>
+      <p:sp>
+        <p:nvSpPr>
+          <p:cNvPr id="2" name="投影片影像版面配置區 1"/>
+          <p:cNvSpPr>
+            <a:spLocks noGrp="1" noRot="1" noChangeAspect="1"/>
+          </p:cNvSpPr>
+          <p:nvPr>
+            <p:ph type="sldImg"/>
+          </p:nvPr>
+        </p:nvSpPr>
+        <p:spPr/>
+      </p:sp>
+      <p:sp>
+        <p:nvSpPr>
+          <p:cNvPr id="3" name="備忘稿版面配置區 2"/>
+          <p:cNvSpPr>
+            <a:spLocks noGrp="1"/>
+          </p:cNvSpPr>
+          <p:nvPr>
+            <p:ph type="body" idx="1"/>
+          </p:nvPr>
+        </p:nvSpPr>
+        <p:spPr/>
+        <p:txBody>
+          <a:bodyPr/>
+          <a:lstStyle/>
+          <a:p>
+            <a:r>
+              <a:rPr lang="en-US" altLang="zh-TW" b="1" i="0" dirty="0">
+                <a:solidFill>
+                  <a:srgbClr val="242424"/>
+                </a:solidFill>
+                <a:effectLst/>
+                <a:latin typeface="Segoe UI" panose="020B0502040204020203" pitchFamily="34" charset="0"/>
+              </a:rPr>
+              <a:t>A young girl in Japanese anime style with a dark theme, gray skin, and silver-gray hair. The hair at the back of her head is short, with two strands much longer than the rest, hanging down to her chest. Her bangs cover one of her deep purple eyes, with no light in the pupils, creating an intense and mysterious gaze. Her entire skin is gray, with no flesh color. She has elf-like ears. There is a purple gem on her chest. Her overall appearance exudes a melancholic and mysterious aura. She is wearing black Gothic clothing and a white oversized sports jacket, with the zipper only halfway up, and a black beret with ribbon decorations. The background is a nighttime street, she is holding many papers with words on them, like a plan, and she is looking at the things in her hands seriously, emphasizing that she is looking at the papers in her hands. The style should not be too realistic, more like a comic character.</a:t>
+            </a:r>
+            <a:endParaRPr lang="zh-TW" altLang="en-US" dirty="0"/>
+          </a:p>
+        </p:txBody>
+      </p:sp>
+      <p:sp>
+        <p:nvSpPr>
+          <p:cNvPr id="4" name="投影片編號版面配置區 3"/>
+          <p:cNvSpPr>
+            <a:spLocks noGrp="1"/>
+          </p:cNvSpPr>
+          <p:nvPr>
+            <p:ph type="sldNum" sz="quarter" idx="5"/>
+          </p:nvPr>
+        </p:nvSpPr>
+        <p:spPr/>
+        <p:txBody>
+          <a:bodyPr/>
+          <a:lstStyle/>
+          <a:p>
+            <a:fld id="{6E3DB6C8-F213-43E3-857E-F7BDCA39C294}" type="slidenum">
+              <a:rPr lang="zh-TW" altLang="en-US" smtClean="0"/>
+              <a:t>4</a:t>
+            </a:fld>
+            <a:endParaRPr lang="zh-TW" altLang="en-US"/>
+          </a:p>
+        </p:txBody>
+      </p:sp>
+    </p:spTree>
+    <p:extLst>
+      <p:ext uri="{BB962C8B-B14F-4D97-AF65-F5344CB8AC3E}">
+        <p14:creationId xmlns:p14="http://schemas.microsoft.com/office/powerpoint/2010/main" val="2277957039"/>
+      </p:ext>
+    </p:extLst>
+  </p:cSld>
+  <p:clrMapOvr>
+    <a:masterClrMapping/>
+  </p:clrMapOvr>
+</p:notes>
+</file>
+
+<file path=ppt/notesSlides/notesSlide5.xml><?xml version="1.0" encoding="utf-8"?>
+<p:notes xmlns:a="http://schemas.openxmlformats.org/drawingml/2006/main" xmlns:r="http://schemas.openxmlformats.org/officeDocument/2006/relationships" xmlns:p="http://schemas.openxmlformats.org/presentationml/2006/main">
+  <p:cSld>
+    <p:spTree>
+      <p:nvGrpSpPr>
+        <p:cNvPr id="1" name=""/>
+        <p:cNvGrpSpPr/>
+        <p:nvPr/>
+      </p:nvGrpSpPr>
+      <p:grpSpPr>
+        <a:xfrm>
+          <a:off x="0" y="0"/>
+          <a:ext cx="0" cy="0"/>
+          <a:chOff x="0" y="0"/>
+          <a:chExt cx="0" cy="0"/>
+        </a:xfrm>
+      </p:grpSpPr>
+      <p:sp>
+        <p:nvSpPr>
+          <p:cNvPr id="2" name="投影片影像版面配置區 1"/>
+          <p:cNvSpPr>
+            <a:spLocks noGrp="1" noRot="1" noChangeAspect="1"/>
+          </p:cNvSpPr>
+          <p:nvPr>
+            <p:ph type="sldImg"/>
+          </p:nvPr>
+        </p:nvSpPr>
+        <p:spPr/>
+      </p:sp>
+      <p:sp>
+        <p:nvSpPr>
+          <p:cNvPr id="3" name="備忘稿版面配置區 2"/>
+          <p:cNvSpPr>
+            <a:spLocks noGrp="1"/>
+          </p:cNvSpPr>
+          <p:nvPr>
+            <p:ph type="body" idx="1"/>
+          </p:nvPr>
+        </p:nvSpPr>
+        <p:spPr/>
+        <p:txBody>
+          <a:bodyPr/>
+          <a:lstStyle/>
+          <a:p>
+            <a:r>
+              <a:rPr lang="en-US" altLang="zh-TW" b="1" i="0" dirty="0">
+                <a:solidFill>
+                  <a:srgbClr val="242424"/>
+                </a:solidFill>
+                <a:effectLst/>
+                <a:latin typeface="Segoe UI" panose="020B0502040204020203" pitchFamily="34" charset="0"/>
+              </a:rPr>
+              <a:t>A young girl in Japanese anime style with a dark theme, gray skin, and silver-gray hair. The hair at the back of her head is short. Her entire skin is gray, with no flesh color. She has elf-like ears. There is a purple gem on her chest. Her overall appearance exudes a melancholic and mysterious aura. She is wearing black Gothic clothing and a white oversized sports jacket, with the zipper only halfway up, and a black beret with ribbon decorations. The background is an abandoned warehouse in the middle of the scene, and the girl is looking at the warehouse. The style should not be too realistic, more like a comic character. Only show the back of the girl, no front view, and she does not need to turn her head, no face should be visible.</a:t>
+            </a:r>
+            <a:endParaRPr lang="zh-TW" altLang="en-US" dirty="0"/>
+          </a:p>
+        </p:txBody>
+      </p:sp>
+      <p:sp>
+        <p:nvSpPr>
+          <p:cNvPr id="4" name="投影片編號版面配置區 3"/>
+          <p:cNvSpPr>
+            <a:spLocks noGrp="1"/>
+          </p:cNvSpPr>
+          <p:nvPr>
+            <p:ph type="sldNum" sz="quarter" idx="5"/>
+          </p:nvPr>
+        </p:nvSpPr>
+        <p:spPr/>
+        <p:txBody>
+          <a:bodyPr/>
+          <a:lstStyle/>
+          <a:p>
+            <a:fld id="{6E3DB6C8-F213-43E3-857E-F7BDCA39C294}" type="slidenum">
+              <a:rPr lang="zh-TW" altLang="en-US" smtClean="0"/>
+              <a:t>5</a:t>
+            </a:fld>
+            <a:endParaRPr lang="zh-TW" altLang="en-US"/>
+          </a:p>
+        </p:txBody>
+      </p:sp>
+    </p:spTree>
+    <p:extLst>
+      <p:ext uri="{BB962C8B-B14F-4D97-AF65-F5344CB8AC3E}">
+        <p14:creationId xmlns:p14="http://schemas.microsoft.com/office/powerpoint/2010/main" val="3853955886"/>
+      </p:ext>
+    </p:extLst>
+  </p:cSld>
+  <p:clrMapOvr>
+    <a:masterClrMapping/>
+  </p:clrMapOvr>
+</p:notes>
+</file>
+
+<file path=ppt/notesSlides/notesSlide6.xml><?xml version="1.0" encoding="utf-8"?>
+<p:notes xmlns:a="http://schemas.openxmlformats.org/drawingml/2006/main" xmlns:r="http://schemas.openxmlformats.org/officeDocument/2006/relationships" xmlns:p="http://schemas.openxmlformats.org/presentationml/2006/main">
+  <p:cSld>
+    <p:spTree>
+      <p:nvGrpSpPr>
+        <p:cNvPr id="1" name=""/>
+        <p:cNvGrpSpPr/>
+        <p:nvPr/>
+      </p:nvGrpSpPr>
+      <p:grpSpPr>
+        <a:xfrm>
+          <a:off x="0" y="0"/>
+          <a:ext cx="0" cy="0"/>
+          <a:chOff x="0" y="0"/>
+          <a:chExt cx="0" cy="0"/>
+        </a:xfrm>
+      </p:grpSpPr>
+      <p:sp>
+        <p:nvSpPr>
+          <p:cNvPr id="2" name="投影片影像版面配置區 1"/>
+          <p:cNvSpPr>
+            <a:spLocks noGrp="1" noRot="1" noChangeAspect="1"/>
+          </p:cNvSpPr>
+          <p:nvPr>
+            <p:ph type="sldImg"/>
+          </p:nvPr>
+        </p:nvSpPr>
+        <p:spPr/>
+      </p:sp>
+      <p:sp>
+        <p:nvSpPr>
+          <p:cNvPr id="3" name="備忘稿版面配置區 2"/>
+          <p:cNvSpPr>
+            <a:spLocks noGrp="1"/>
+          </p:cNvSpPr>
+          <p:nvPr>
+            <p:ph type="body" idx="1"/>
+          </p:nvPr>
+        </p:nvSpPr>
+        <p:spPr/>
+        <p:txBody>
+          <a:bodyPr/>
+          <a:lstStyle/>
+          <a:p>
+            <a:r>
+              <a:rPr lang="en-US" altLang="zh-TW" b="1" i="0" dirty="0">
+                <a:solidFill>
+                  <a:srgbClr val="242424"/>
+                </a:solidFill>
+                <a:effectLst/>
+                <a:latin typeface="Segoe UI" panose="020B0502040204020203" pitchFamily="34" charset="0"/>
+              </a:rPr>
+              <a:t>In an abandoned warehouse, there are two characters. One is a young girl with a dark theme, gray skin, and silver-gray hair. The hair at the back of her head is short. Her entire skin is gray, with no flesh color. She has elf-like ears. There is a purple gem on her chest. Her overall appearance exudes a melancholic and mysterious aura. She is wearing black Gothic clothing and a white oversized sports jacket, with the zipper only halfway up, and a black beret with ribbon decorations. She is facing away from us, showing only her back. Outside the warehouse stands a mature beautiful human woman with long white curly hair, wearing a modern black dress with a high-low hemline that reveals her legs, long socks, and a big black hat with red rose decorations, looking at the young girl. The style should not be too realistic, more like a comic character.</a:t>
+            </a:r>
+            <a:endParaRPr lang="zh-TW" altLang="en-US" dirty="0"/>
+          </a:p>
+        </p:txBody>
+      </p:sp>
+      <p:sp>
+        <p:nvSpPr>
+          <p:cNvPr id="4" name="投影片編號版面配置區 3"/>
+          <p:cNvSpPr>
+            <a:spLocks noGrp="1"/>
+          </p:cNvSpPr>
+          <p:nvPr>
+            <p:ph type="sldNum" sz="quarter" idx="5"/>
+          </p:nvPr>
+        </p:nvSpPr>
+        <p:spPr/>
+        <p:txBody>
+          <a:bodyPr/>
+          <a:lstStyle/>
+          <a:p>
+            <a:fld id="{6E3DB6C8-F213-43E3-857E-F7BDCA39C294}" type="slidenum">
+              <a:rPr lang="zh-TW" altLang="en-US" smtClean="0"/>
+              <a:t>6</a:t>
+            </a:fld>
+            <a:endParaRPr lang="zh-TW" altLang="en-US"/>
+          </a:p>
+        </p:txBody>
+      </p:sp>
+    </p:spTree>
+    <p:extLst>
+      <p:ext uri="{BB962C8B-B14F-4D97-AF65-F5344CB8AC3E}">
+        <p14:creationId xmlns:p14="http://schemas.microsoft.com/office/powerpoint/2010/main" val="86704021"/>
+      </p:ext>
+    </p:extLst>
+  </p:cSld>
+  <p:clrMapOvr>
+    <a:masterClrMapping/>
+  </p:clrMapOvr>
+</p:notes>
+</file>
+
+<file path=ppt/notesSlides/notesSlide7.xml><?xml version="1.0" encoding="utf-8"?>
+<p:notes xmlns:a="http://schemas.openxmlformats.org/drawingml/2006/main" xmlns:r="http://schemas.openxmlformats.org/officeDocument/2006/relationships" xmlns:p="http://schemas.openxmlformats.org/presentationml/2006/main">
+  <p:cSld>
+    <p:spTree>
+      <p:nvGrpSpPr>
+        <p:cNvPr id="1" name=""/>
+        <p:cNvGrpSpPr/>
+        <p:nvPr/>
+      </p:nvGrpSpPr>
+      <p:grpSpPr>
+        <a:xfrm>
+          <a:off x="0" y="0"/>
+          <a:ext cx="0" cy="0"/>
+          <a:chOff x="0" y="0"/>
+          <a:chExt cx="0" cy="0"/>
+        </a:xfrm>
+      </p:grpSpPr>
+      <p:sp>
+        <p:nvSpPr>
+          <p:cNvPr id="2" name="投影片影像版面配置區 1"/>
+          <p:cNvSpPr>
+            <a:spLocks noGrp="1" noRot="1" noChangeAspect="1"/>
+          </p:cNvSpPr>
+          <p:nvPr>
+            <p:ph type="sldImg"/>
+          </p:nvPr>
+        </p:nvSpPr>
+        <p:spPr/>
+      </p:sp>
+      <p:sp>
+        <p:nvSpPr>
+          <p:cNvPr id="3" name="備忘稿版面配置區 2"/>
+          <p:cNvSpPr>
+            <a:spLocks noGrp="1"/>
+          </p:cNvSpPr>
+          <p:nvPr>
+            <p:ph type="body" idx="1"/>
+          </p:nvPr>
+        </p:nvSpPr>
+        <p:spPr/>
+        <p:txBody>
+          <a:bodyPr/>
+          <a:lstStyle/>
+          <a:p>
+            <a:r>
+              <a:rPr lang="en-US" altLang="zh-TW" b="1" i="0" dirty="0">
+                <a:solidFill>
+                  <a:srgbClr val="242424"/>
+                </a:solidFill>
+                <a:effectLst/>
+                <a:latin typeface="Segoe UI" panose="020B0502040204020203" pitchFamily="34" charset="0"/>
+              </a:rPr>
+              <a:t>In an abandoned warehouse, there are two characters. One is a young girl with a dark theme, gray skin, and silver-gray hair. The hair at the back of her head is short. Her entire skin is gray, with no flesh color. She has elf-like ears. There is a purple gem on her chest. Her overall appearance exudes a melancholic and mysterious aura. She is wearing black Gothic clothing and a white oversized sports jacket, with the zipper only halfway up, and a black beret with ribbon decorations. She is climbing out of the warehouse window, facing forward, but turning her head to look at the long-haired woman. Outside the warehouse stands a mature beautiful human woman with long white curly hair, wearing a modern black dress with a high-low hemline that reveals her legs, long socks, and a big black hat with red rose decorations, standing at the main entrance, looking at the young girl. The style should not be too realistic, more like a Japanese comic character, and the distance between the two girls should be greater.</a:t>
+            </a:r>
+            <a:endParaRPr lang="zh-TW" altLang="en-US" dirty="0"/>
+          </a:p>
+        </p:txBody>
+      </p:sp>
+      <p:sp>
+        <p:nvSpPr>
+          <p:cNvPr id="4" name="投影片編號版面配置區 3"/>
+          <p:cNvSpPr>
+            <a:spLocks noGrp="1"/>
+          </p:cNvSpPr>
+          <p:nvPr>
+            <p:ph type="sldNum" sz="quarter" idx="5"/>
+          </p:nvPr>
+        </p:nvSpPr>
+        <p:spPr/>
+        <p:txBody>
+          <a:bodyPr/>
+          <a:lstStyle/>
+          <a:p>
+            <a:fld id="{6E3DB6C8-F213-43E3-857E-F7BDCA39C294}" type="slidenum">
+              <a:rPr lang="zh-TW" altLang="en-US" smtClean="0"/>
+              <a:t>7</a:t>
+            </a:fld>
+            <a:endParaRPr lang="zh-TW" altLang="en-US"/>
+          </a:p>
+        </p:txBody>
+      </p:sp>
+    </p:spTree>
+    <p:extLst>
+      <p:ext uri="{BB962C8B-B14F-4D97-AF65-F5344CB8AC3E}">
+        <p14:creationId xmlns:p14="http://schemas.microsoft.com/office/powerpoint/2010/main" val="624272787"/>
+      </p:ext>
+    </p:extLst>
+  </p:cSld>
+  <p:clrMapOvr>
+    <a:masterClrMapping/>
+  </p:clrMapOvr>
+</p:notes>
+</file>
+
+<file path=ppt/notesSlides/notesSlide8.xml><?xml version="1.0" encoding="utf-8"?>
+<p:notes xmlns:a="http://schemas.openxmlformats.org/drawingml/2006/main" xmlns:r="http://schemas.openxmlformats.org/officeDocument/2006/relationships" xmlns:p="http://schemas.openxmlformats.org/presentationml/2006/main">
+  <p:cSld>
+    <p:spTree>
+      <p:nvGrpSpPr>
+        <p:cNvPr id="1" name=""/>
+        <p:cNvGrpSpPr/>
+        <p:nvPr/>
+      </p:nvGrpSpPr>
+      <p:grpSpPr>
+        <a:xfrm>
+          <a:off x="0" y="0"/>
+          <a:ext cx="0" cy="0"/>
+          <a:chOff x="0" y="0"/>
+          <a:chExt cx="0" cy="0"/>
+        </a:xfrm>
+      </p:grpSpPr>
+      <p:sp>
+        <p:nvSpPr>
+          <p:cNvPr id="2" name="投影片影像版面配置區 1"/>
+          <p:cNvSpPr>
+            <a:spLocks noGrp="1" noRot="1" noChangeAspect="1"/>
+          </p:cNvSpPr>
+          <p:nvPr>
+            <p:ph type="sldImg"/>
+          </p:nvPr>
+        </p:nvSpPr>
+        <p:spPr/>
+      </p:sp>
+      <p:sp>
+        <p:nvSpPr>
+          <p:cNvPr id="3" name="備忘稿版面配置區 2"/>
+          <p:cNvSpPr>
+            <a:spLocks noGrp="1"/>
+          </p:cNvSpPr>
+          <p:nvPr>
+            <p:ph type="body" idx="1"/>
+          </p:nvPr>
+        </p:nvSpPr>
+        <p:spPr/>
+        <p:txBody>
+          <a:bodyPr/>
+          <a:lstStyle/>
+          <a:p>
+            <a:r>
+              <a:rPr lang="en-US" altLang="zh-TW" b="1" i="0" dirty="0">
+                <a:solidFill>
+                  <a:srgbClr val="242424"/>
+                </a:solidFill>
+                <a:effectLst/>
+                <a:latin typeface="Segoe UI" panose="020B0502040204020203" pitchFamily="34" charset="0"/>
+              </a:rPr>
+              <a:t>In an abandoned warehouse, there are two characters. One is a young girl with a dark theme, gray skin, and silver-gray hair. The hair at the back of her head is short. Her entire skin is gray, with no flesh color. She has elf-like ears. There is a purple gem on her chest. Her overall appearance exudes a melancholic and mysterious aura. She is wearing black Gothic clothing and a white oversized sports jacket, with the zipper only halfway up, and a black beret with ribbon decorations. She is shaking hands with the long-haired woman, and the angle of the image should be from their side. The young girl is shorter and younger than the long-haired woman. Outside the warehouse stands a mature beautiful human woman with long white curly hair, wearing a modern black dress with a high-low hemline that reveals her legs, long socks, and a big black hat with red rose decorations, looking at the young girl. The style should be more like a Japanese comic character, and the distance between the two girls should be greater. The long-haired woman should be taller and more mature, and the short-haired girl should have a black beret, while the long-haired woman should have a big hat.</a:t>
+            </a:r>
+            <a:endParaRPr lang="zh-TW" altLang="en-US" dirty="0"/>
+          </a:p>
+        </p:txBody>
+      </p:sp>
+      <p:sp>
+        <p:nvSpPr>
+          <p:cNvPr id="4" name="投影片編號版面配置區 3"/>
+          <p:cNvSpPr>
+            <a:spLocks noGrp="1"/>
+          </p:cNvSpPr>
+          <p:nvPr>
+            <p:ph type="sldNum" sz="quarter" idx="5"/>
+          </p:nvPr>
+        </p:nvSpPr>
+        <p:spPr/>
+        <p:txBody>
+          <a:bodyPr/>
+          <a:lstStyle/>
+          <a:p>
+            <a:fld id="{6E3DB6C8-F213-43E3-857E-F7BDCA39C294}" type="slidenum">
+              <a:rPr lang="zh-TW" altLang="en-US" smtClean="0"/>
+              <a:t>8</a:t>
+            </a:fld>
+            <a:endParaRPr lang="zh-TW" altLang="en-US"/>
+          </a:p>
+        </p:txBody>
+      </p:sp>
+    </p:spTree>
+    <p:extLst>
+      <p:ext uri="{BB962C8B-B14F-4D97-AF65-F5344CB8AC3E}">
+        <p14:creationId xmlns:p14="http://schemas.microsoft.com/office/powerpoint/2010/main" val="69567164"/>
+      </p:ext>
+    </p:extLst>
+  </p:cSld>
+  <p:clrMapOvr>
+    <a:masterClrMapping/>
+  </p:clrMapOvr>
+</p:notes>
 </file>
 
 <file path=ppt/slideLayouts/slideLayout1.xml><?xml version="1.0" encoding="utf-8"?>
@@ -129,7 +1235,7 @@
           <p:cNvPr id="2" name="標題 1">
             <a:extLst>
               <a:ext uri="{FF2B5EF4-FFF2-40B4-BE49-F238E27FC236}">
-                <a16:creationId xmlns:a16="http://schemas.microsoft.com/office/drawing/2014/main" id="{EB5CC918-B447-434E-B98E-5847BB49C259}"/>
+                <a16:creationId xmlns:a16="http://schemas.microsoft.com/office/drawing/2014/main" id="{9A82033A-A5B6-11DF-7CF3-C5CAB6CE782C}"/>
               </a:ext>
             </a:extLst>
           </p:cNvPr>
@@ -166,7 +1272,7 @@
           <p:cNvPr id="3" name="副標題 2">
             <a:extLst>
               <a:ext uri="{FF2B5EF4-FFF2-40B4-BE49-F238E27FC236}">
-                <a16:creationId xmlns:a16="http://schemas.microsoft.com/office/drawing/2014/main" id="{817FCC70-CC4E-4CB6-B2CF-9FDA5AC4D346}"/>
+                <a16:creationId xmlns:a16="http://schemas.microsoft.com/office/drawing/2014/main" id="{34A4B1ED-8DAD-32F6-83F1-F4D3DB522603}"/>
               </a:ext>
             </a:extLst>
           </p:cNvPr>
@@ -236,7 +1342,7 @@
           <p:cNvPr id="4" name="日期版面配置區 3">
             <a:extLst>
               <a:ext uri="{FF2B5EF4-FFF2-40B4-BE49-F238E27FC236}">
-                <a16:creationId xmlns:a16="http://schemas.microsoft.com/office/drawing/2014/main" id="{BD08F018-0004-4322-AD0F-E6E740964233}"/>
+                <a16:creationId xmlns:a16="http://schemas.microsoft.com/office/drawing/2014/main" id="{438A174B-C124-3A58-DBB8-A1840771B5CB}"/>
               </a:ext>
             </a:extLst>
           </p:cNvPr>
@@ -252,9 +1358,9 @@
           <a:bodyPr/>
           <a:lstStyle/>
           <a:p>
-            <a:fld id="{C3C90D7E-32D6-4894-AE08-7BBB3E610FC9}" type="datetimeFigureOut">
+            <a:fld id="{458E591F-1D90-4A08-BEBB-9552D45ACD8D}" type="datetimeFigureOut">
               <a:rPr lang="zh-TW" altLang="en-US" smtClean="0"/>
-              <a:t>2024/9/16</a:t>
+              <a:t>2024/10/26</a:t>
             </a:fld>
             <a:endParaRPr lang="zh-TW" altLang="en-US"/>
           </a:p>
@@ -265,7 +1371,7 @@
           <p:cNvPr id="5" name="頁尾版面配置區 4">
             <a:extLst>
               <a:ext uri="{FF2B5EF4-FFF2-40B4-BE49-F238E27FC236}">
-                <a16:creationId xmlns:a16="http://schemas.microsoft.com/office/drawing/2014/main" id="{30427B34-CB13-41C7-B2F2-CED9BDC5B595}"/>
+                <a16:creationId xmlns:a16="http://schemas.microsoft.com/office/drawing/2014/main" id="{43B844DD-0013-70B8-1AB3-0DD5DB74A5C8}"/>
               </a:ext>
             </a:extLst>
           </p:cNvPr>
@@ -290,7 +1396,7 @@
           <p:cNvPr id="6" name="投影片編號版面配置區 5">
             <a:extLst>
               <a:ext uri="{FF2B5EF4-FFF2-40B4-BE49-F238E27FC236}">
-                <a16:creationId xmlns:a16="http://schemas.microsoft.com/office/drawing/2014/main" id="{76FA962E-5B03-439A-928C-87366876542D}"/>
+                <a16:creationId xmlns:a16="http://schemas.microsoft.com/office/drawing/2014/main" id="{13F1365B-AF31-F91C-1F15-F144CA22DE30}"/>
               </a:ext>
             </a:extLst>
           </p:cNvPr>
@@ -306,7 +1412,7 @@
           <a:bodyPr/>
           <a:lstStyle/>
           <a:p>
-            <a:fld id="{E31EC408-072F-4346-BD0A-D6AA5788A305}" type="slidenum">
+            <a:fld id="{9B3887EC-0C89-4BEA-9AE1-52834055F7A5}" type="slidenum">
               <a:rPr lang="zh-TW" altLang="en-US" smtClean="0"/>
               <a:t>‹#›</a:t>
             </a:fld>
@@ -317,13 +1423,25 @@
     </p:spTree>
     <p:extLst>
       <p:ext uri="{BB962C8B-B14F-4D97-AF65-F5344CB8AC3E}">
-        <p14:creationId xmlns:p14="http://schemas.microsoft.com/office/powerpoint/2010/main" val="2963035110"/>
+        <p14:creationId xmlns:p14="http://schemas.microsoft.com/office/powerpoint/2010/main" val="3770610259"/>
       </p:ext>
     </p:extLst>
   </p:cSld>
   <p:clrMapOvr>
     <a:masterClrMapping/>
   </p:clrMapOvr>
+  <mc:AlternateContent xmlns:mc="http://schemas.openxmlformats.org/markup-compatibility/2006">
+    <mc:Choice xmlns:p159="http://schemas.microsoft.com/office/powerpoint/2015/09/main" Requires="p159">
+      <p:transition xmlns:p14="http://schemas.microsoft.com/office/powerpoint/2010/main" spd="slow" p14:dur="2000">
+        <p159:morph option="byObject"/>
+      </p:transition>
+    </mc:Choice>
+    <mc:Fallback>
+      <p:transition spd="slow">
+        <p:fade/>
+      </p:transition>
+    </mc:Fallback>
+  </mc:AlternateContent>
 </p:sldLayout>
 </file>
 
@@ -349,7 +1467,7 @@
           <p:cNvPr id="2" name="標題 1">
             <a:extLst>
               <a:ext uri="{FF2B5EF4-FFF2-40B4-BE49-F238E27FC236}">
-                <a16:creationId xmlns:a16="http://schemas.microsoft.com/office/drawing/2014/main" id="{A02F0018-7F8E-4206-A929-07CDC6B5F34A}"/>
+                <a16:creationId xmlns:a16="http://schemas.microsoft.com/office/drawing/2014/main" id="{D5ED1B84-52AA-77D4-880B-660A51195D34}"/>
               </a:ext>
             </a:extLst>
           </p:cNvPr>
@@ -377,7 +1495,7 @@
           <p:cNvPr id="3" name="直排文字版面配置區 2">
             <a:extLst>
               <a:ext uri="{FF2B5EF4-FFF2-40B4-BE49-F238E27FC236}">
-                <a16:creationId xmlns:a16="http://schemas.microsoft.com/office/drawing/2014/main" id="{9B801E88-34C3-4545-A358-81F5614FED64}"/>
+                <a16:creationId xmlns:a16="http://schemas.microsoft.com/office/drawing/2014/main" id="{950636C2-EF57-17FD-B3DD-2660477A03DF}"/>
               </a:ext>
             </a:extLst>
           </p:cNvPr>
@@ -434,7 +1552,7 @@
           <p:cNvPr id="4" name="日期版面配置區 3">
             <a:extLst>
               <a:ext uri="{FF2B5EF4-FFF2-40B4-BE49-F238E27FC236}">
-                <a16:creationId xmlns:a16="http://schemas.microsoft.com/office/drawing/2014/main" id="{60AFD716-8B99-4230-B55F-C8B88ECBB171}"/>
+                <a16:creationId xmlns:a16="http://schemas.microsoft.com/office/drawing/2014/main" id="{FFB51614-AEB1-99AB-FC82-FF4D2F3549B4}"/>
               </a:ext>
             </a:extLst>
           </p:cNvPr>
@@ -450,9 +1568,9 @@
           <a:bodyPr/>
           <a:lstStyle/>
           <a:p>
-            <a:fld id="{C3C90D7E-32D6-4894-AE08-7BBB3E610FC9}" type="datetimeFigureOut">
+            <a:fld id="{458E591F-1D90-4A08-BEBB-9552D45ACD8D}" type="datetimeFigureOut">
               <a:rPr lang="zh-TW" altLang="en-US" smtClean="0"/>
-              <a:t>2024/9/16</a:t>
+              <a:t>2024/10/26</a:t>
             </a:fld>
             <a:endParaRPr lang="zh-TW" altLang="en-US"/>
           </a:p>
@@ -463,7 +1581,7 @@
           <p:cNvPr id="5" name="頁尾版面配置區 4">
             <a:extLst>
               <a:ext uri="{FF2B5EF4-FFF2-40B4-BE49-F238E27FC236}">
-                <a16:creationId xmlns:a16="http://schemas.microsoft.com/office/drawing/2014/main" id="{EA374743-76D9-4BF8-A60C-2F50B2636A8A}"/>
+                <a16:creationId xmlns:a16="http://schemas.microsoft.com/office/drawing/2014/main" id="{DBC291AD-ECF3-41A8-B7B4-CADCFE1F0ECC}"/>
               </a:ext>
             </a:extLst>
           </p:cNvPr>
@@ -488,7 +1606,7 @@
           <p:cNvPr id="6" name="投影片編號版面配置區 5">
             <a:extLst>
               <a:ext uri="{FF2B5EF4-FFF2-40B4-BE49-F238E27FC236}">
-                <a16:creationId xmlns:a16="http://schemas.microsoft.com/office/drawing/2014/main" id="{00454594-6C11-4013-A666-A151E960EC9B}"/>
+                <a16:creationId xmlns:a16="http://schemas.microsoft.com/office/drawing/2014/main" id="{9E041B26-18DE-A8DB-D2B4-83DF86F6DC7A}"/>
               </a:ext>
             </a:extLst>
           </p:cNvPr>
@@ -504,7 +1622,7 @@
           <a:bodyPr/>
           <a:lstStyle/>
           <a:p>
-            <a:fld id="{E31EC408-072F-4346-BD0A-D6AA5788A305}" type="slidenum">
+            <a:fld id="{9B3887EC-0C89-4BEA-9AE1-52834055F7A5}" type="slidenum">
               <a:rPr lang="zh-TW" altLang="en-US" smtClean="0"/>
               <a:t>‹#›</a:t>
             </a:fld>
@@ -515,13 +1633,25 @@
     </p:spTree>
     <p:extLst>
       <p:ext uri="{BB962C8B-B14F-4D97-AF65-F5344CB8AC3E}">
-        <p14:creationId xmlns:p14="http://schemas.microsoft.com/office/powerpoint/2010/main" val="188953001"/>
+        <p14:creationId xmlns:p14="http://schemas.microsoft.com/office/powerpoint/2010/main" val="2096744003"/>
       </p:ext>
     </p:extLst>
   </p:cSld>
   <p:clrMapOvr>
     <a:masterClrMapping/>
   </p:clrMapOvr>
+  <mc:AlternateContent xmlns:mc="http://schemas.openxmlformats.org/markup-compatibility/2006">
+    <mc:Choice xmlns:p159="http://schemas.microsoft.com/office/powerpoint/2015/09/main" Requires="p159">
+      <p:transition xmlns:p14="http://schemas.microsoft.com/office/powerpoint/2010/main" spd="slow" p14:dur="2000">
+        <p159:morph option="byObject"/>
+      </p:transition>
+    </mc:Choice>
+    <mc:Fallback>
+      <p:transition spd="slow">
+        <p:fade/>
+      </p:transition>
+    </mc:Fallback>
+  </mc:AlternateContent>
 </p:sldLayout>
 </file>
 
@@ -547,7 +1677,7 @@
           <p:cNvPr id="2" name="直排標題 1">
             <a:extLst>
               <a:ext uri="{FF2B5EF4-FFF2-40B4-BE49-F238E27FC236}">
-                <a16:creationId xmlns:a16="http://schemas.microsoft.com/office/drawing/2014/main" id="{70F760AC-E708-4605-85E2-7D0F424B3E29}"/>
+                <a16:creationId xmlns:a16="http://schemas.microsoft.com/office/drawing/2014/main" id="{A92437F2-0ADF-3939-01E8-B604588DBD9D}"/>
               </a:ext>
             </a:extLst>
           </p:cNvPr>
@@ -580,7 +1710,7 @@
           <p:cNvPr id="3" name="直排文字版面配置區 2">
             <a:extLst>
               <a:ext uri="{FF2B5EF4-FFF2-40B4-BE49-F238E27FC236}">
-                <a16:creationId xmlns:a16="http://schemas.microsoft.com/office/drawing/2014/main" id="{84BECF48-F3B6-4D47-82A8-C6AE92EDC2F0}"/>
+                <a16:creationId xmlns:a16="http://schemas.microsoft.com/office/drawing/2014/main" id="{F0AACD98-EFBD-EC3D-41D4-13E0E725A24B}"/>
               </a:ext>
             </a:extLst>
           </p:cNvPr>
@@ -642,7 +1772,7 @@
           <p:cNvPr id="4" name="日期版面配置區 3">
             <a:extLst>
               <a:ext uri="{FF2B5EF4-FFF2-40B4-BE49-F238E27FC236}">
-                <a16:creationId xmlns:a16="http://schemas.microsoft.com/office/drawing/2014/main" id="{215DE52A-093E-4116-A2FE-F61BA999B89F}"/>
+                <a16:creationId xmlns:a16="http://schemas.microsoft.com/office/drawing/2014/main" id="{2394D3C1-C3DE-D4A2-8823-2231AD4854DC}"/>
               </a:ext>
             </a:extLst>
           </p:cNvPr>
@@ -658,9 +1788,9 @@
           <a:bodyPr/>
           <a:lstStyle/>
           <a:p>
-            <a:fld id="{C3C90D7E-32D6-4894-AE08-7BBB3E610FC9}" type="datetimeFigureOut">
+            <a:fld id="{458E591F-1D90-4A08-BEBB-9552D45ACD8D}" type="datetimeFigureOut">
               <a:rPr lang="zh-TW" altLang="en-US" smtClean="0"/>
-              <a:t>2024/9/16</a:t>
+              <a:t>2024/10/26</a:t>
             </a:fld>
             <a:endParaRPr lang="zh-TW" altLang="en-US"/>
           </a:p>
@@ -671,7 +1801,7 @@
           <p:cNvPr id="5" name="頁尾版面配置區 4">
             <a:extLst>
               <a:ext uri="{FF2B5EF4-FFF2-40B4-BE49-F238E27FC236}">
-                <a16:creationId xmlns:a16="http://schemas.microsoft.com/office/drawing/2014/main" id="{34553FE1-A5D9-4070-AA9C-378F491D4677}"/>
+                <a16:creationId xmlns:a16="http://schemas.microsoft.com/office/drawing/2014/main" id="{92BC1AA6-C12C-5D5C-0B01-B77127E6AE3D}"/>
               </a:ext>
             </a:extLst>
           </p:cNvPr>
@@ -696,7 +1826,7 @@
           <p:cNvPr id="6" name="投影片編號版面配置區 5">
             <a:extLst>
               <a:ext uri="{FF2B5EF4-FFF2-40B4-BE49-F238E27FC236}">
-                <a16:creationId xmlns:a16="http://schemas.microsoft.com/office/drawing/2014/main" id="{928EFDDC-5B11-4543-8144-518625EDA57F}"/>
+                <a16:creationId xmlns:a16="http://schemas.microsoft.com/office/drawing/2014/main" id="{ECAC8E24-F4AC-FFEF-935D-BB59180F91B6}"/>
               </a:ext>
             </a:extLst>
           </p:cNvPr>
@@ -712,7 +1842,7 @@
           <a:bodyPr/>
           <a:lstStyle/>
           <a:p>
-            <a:fld id="{E31EC408-072F-4346-BD0A-D6AA5788A305}" type="slidenum">
+            <a:fld id="{9B3887EC-0C89-4BEA-9AE1-52834055F7A5}" type="slidenum">
               <a:rPr lang="zh-TW" altLang="en-US" smtClean="0"/>
               <a:t>‹#›</a:t>
             </a:fld>
@@ -723,13 +1853,25 @@
     </p:spTree>
     <p:extLst>
       <p:ext uri="{BB962C8B-B14F-4D97-AF65-F5344CB8AC3E}">
-        <p14:creationId xmlns:p14="http://schemas.microsoft.com/office/powerpoint/2010/main" val="2483123943"/>
+        <p14:creationId xmlns:p14="http://schemas.microsoft.com/office/powerpoint/2010/main" val="637927967"/>
       </p:ext>
     </p:extLst>
   </p:cSld>
   <p:clrMapOvr>
     <a:masterClrMapping/>
   </p:clrMapOvr>
+  <mc:AlternateContent xmlns:mc="http://schemas.openxmlformats.org/markup-compatibility/2006">
+    <mc:Choice xmlns:p159="http://schemas.microsoft.com/office/powerpoint/2015/09/main" Requires="p159">
+      <p:transition xmlns:p14="http://schemas.microsoft.com/office/powerpoint/2010/main" spd="slow" p14:dur="2000">
+        <p159:morph option="byObject"/>
+      </p:transition>
+    </mc:Choice>
+    <mc:Fallback>
+      <p:transition spd="slow">
+        <p:fade/>
+      </p:transition>
+    </mc:Fallback>
+  </mc:AlternateContent>
 </p:sldLayout>
 </file>
 
@@ -755,7 +1897,7 @@
           <p:cNvPr id="2" name="標題 1">
             <a:extLst>
               <a:ext uri="{FF2B5EF4-FFF2-40B4-BE49-F238E27FC236}">
-                <a16:creationId xmlns:a16="http://schemas.microsoft.com/office/drawing/2014/main" id="{A1BFCF4C-FB58-444C-B754-A594851E4C7B}"/>
+                <a16:creationId xmlns:a16="http://schemas.microsoft.com/office/drawing/2014/main" id="{C05D7F5D-0ADB-B1D2-CB6D-CAB345E052D1}"/>
               </a:ext>
             </a:extLst>
           </p:cNvPr>
@@ -783,7 +1925,7 @@
           <p:cNvPr id="3" name="內容版面配置區 2">
             <a:extLst>
               <a:ext uri="{FF2B5EF4-FFF2-40B4-BE49-F238E27FC236}">
-                <a16:creationId xmlns:a16="http://schemas.microsoft.com/office/drawing/2014/main" id="{987C475D-648F-4511-A6FE-04B04F755F93}"/>
+                <a16:creationId xmlns:a16="http://schemas.microsoft.com/office/drawing/2014/main" id="{4B40D6F0-E305-82EB-0890-829F96670CFA}"/>
               </a:ext>
             </a:extLst>
           </p:cNvPr>
@@ -840,7 +1982,7 @@
           <p:cNvPr id="4" name="日期版面配置區 3">
             <a:extLst>
               <a:ext uri="{FF2B5EF4-FFF2-40B4-BE49-F238E27FC236}">
-                <a16:creationId xmlns:a16="http://schemas.microsoft.com/office/drawing/2014/main" id="{F511FCF8-D8F7-4914-920F-D63F2D97F713}"/>
+                <a16:creationId xmlns:a16="http://schemas.microsoft.com/office/drawing/2014/main" id="{46020A19-8539-4E39-AF14-AF8D232B4AD2}"/>
               </a:ext>
             </a:extLst>
           </p:cNvPr>
@@ -856,9 +1998,9 @@
           <a:bodyPr/>
           <a:lstStyle/>
           <a:p>
-            <a:fld id="{C3C90D7E-32D6-4894-AE08-7BBB3E610FC9}" type="datetimeFigureOut">
+            <a:fld id="{458E591F-1D90-4A08-BEBB-9552D45ACD8D}" type="datetimeFigureOut">
               <a:rPr lang="zh-TW" altLang="en-US" smtClean="0"/>
-              <a:t>2024/9/16</a:t>
+              <a:t>2024/10/26</a:t>
             </a:fld>
             <a:endParaRPr lang="zh-TW" altLang="en-US"/>
           </a:p>
@@ -869,7 +2011,7 @@
           <p:cNvPr id="5" name="頁尾版面配置區 4">
             <a:extLst>
               <a:ext uri="{FF2B5EF4-FFF2-40B4-BE49-F238E27FC236}">
-                <a16:creationId xmlns:a16="http://schemas.microsoft.com/office/drawing/2014/main" id="{7E1D3E8F-338D-4B4D-B411-5282866FF95D}"/>
+                <a16:creationId xmlns:a16="http://schemas.microsoft.com/office/drawing/2014/main" id="{23F68F80-93D8-FC06-423F-3043DD3BFFDA}"/>
               </a:ext>
             </a:extLst>
           </p:cNvPr>
@@ -894,7 +2036,7 @@
           <p:cNvPr id="6" name="投影片編號版面配置區 5">
             <a:extLst>
               <a:ext uri="{FF2B5EF4-FFF2-40B4-BE49-F238E27FC236}">
-                <a16:creationId xmlns:a16="http://schemas.microsoft.com/office/drawing/2014/main" id="{F7DF3AD5-06B6-42D8-AEDF-66CCE6582524}"/>
+                <a16:creationId xmlns:a16="http://schemas.microsoft.com/office/drawing/2014/main" id="{FB05AF08-E524-40A6-5B98-13B4BB8DA404}"/>
               </a:ext>
             </a:extLst>
           </p:cNvPr>
@@ -910,7 +2052,7 @@
           <a:bodyPr/>
           <a:lstStyle/>
           <a:p>
-            <a:fld id="{E31EC408-072F-4346-BD0A-D6AA5788A305}" type="slidenum">
+            <a:fld id="{9B3887EC-0C89-4BEA-9AE1-52834055F7A5}" type="slidenum">
               <a:rPr lang="zh-TW" altLang="en-US" smtClean="0"/>
               <a:t>‹#›</a:t>
             </a:fld>
@@ -921,13 +2063,25 @@
     </p:spTree>
     <p:extLst>
       <p:ext uri="{BB962C8B-B14F-4D97-AF65-F5344CB8AC3E}">
-        <p14:creationId xmlns:p14="http://schemas.microsoft.com/office/powerpoint/2010/main" val="4198509733"/>
+        <p14:creationId xmlns:p14="http://schemas.microsoft.com/office/powerpoint/2010/main" val="2745784277"/>
       </p:ext>
     </p:extLst>
   </p:cSld>
   <p:clrMapOvr>
     <a:masterClrMapping/>
   </p:clrMapOvr>
+  <mc:AlternateContent xmlns:mc="http://schemas.openxmlformats.org/markup-compatibility/2006">
+    <mc:Choice xmlns:p159="http://schemas.microsoft.com/office/powerpoint/2015/09/main" Requires="p159">
+      <p:transition xmlns:p14="http://schemas.microsoft.com/office/powerpoint/2010/main" spd="slow" p14:dur="2000">
+        <p159:morph option="byObject"/>
+      </p:transition>
+    </mc:Choice>
+    <mc:Fallback>
+      <p:transition spd="slow">
+        <p:fade/>
+      </p:transition>
+    </mc:Fallback>
+  </mc:AlternateContent>
 </p:sldLayout>
 </file>
 
@@ -953,7 +2107,7 @@
           <p:cNvPr id="2" name="標題 1">
             <a:extLst>
               <a:ext uri="{FF2B5EF4-FFF2-40B4-BE49-F238E27FC236}">
-                <a16:creationId xmlns:a16="http://schemas.microsoft.com/office/drawing/2014/main" id="{5986B870-2B24-4658-9AEB-3C92E8E40B41}"/>
+                <a16:creationId xmlns:a16="http://schemas.microsoft.com/office/drawing/2014/main" id="{39F1F42F-1123-CFB3-25AD-6C5CD6FB3371}"/>
               </a:ext>
             </a:extLst>
           </p:cNvPr>
@@ -990,7 +2144,7 @@
           <p:cNvPr id="3" name="文字版面配置區 2">
             <a:extLst>
               <a:ext uri="{FF2B5EF4-FFF2-40B4-BE49-F238E27FC236}">
-                <a16:creationId xmlns:a16="http://schemas.microsoft.com/office/drawing/2014/main" id="{90235018-E757-4630-8511-F466B919268F}"/>
+                <a16:creationId xmlns:a16="http://schemas.microsoft.com/office/drawing/2014/main" id="{4289886A-3059-4061-FC86-35F54E768F42}"/>
               </a:ext>
             </a:extLst>
           </p:cNvPr>
@@ -1115,7 +2269,7 @@
           <p:cNvPr id="4" name="日期版面配置區 3">
             <a:extLst>
               <a:ext uri="{FF2B5EF4-FFF2-40B4-BE49-F238E27FC236}">
-                <a16:creationId xmlns:a16="http://schemas.microsoft.com/office/drawing/2014/main" id="{37546C76-CF19-433D-9070-0A54A149F1B2}"/>
+                <a16:creationId xmlns:a16="http://schemas.microsoft.com/office/drawing/2014/main" id="{FF3E6055-9973-F3FD-DB6C-80D66E05116F}"/>
               </a:ext>
             </a:extLst>
           </p:cNvPr>
@@ -1131,9 +2285,9 @@
           <a:bodyPr/>
           <a:lstStyle/>
           <a:p>
-            <a:fld id="{C3C90D7E-32D6-4894-AE08-7BBB3E610FC9}" type="datetimeFigureOut">
+            <a:fld id="{458E591F-1D90-4A08-BEBB-9552D45ACD8D}" type="datetimeFigureOut">
               <a:rPr lang="zh-TW" altLang="en-US" smtClean="0"/>
-              <a:t>2024/9/16</a:t>
+              <a:t>2024/10/26</a:t>
             </a:fld>
             <a:endParaRPr lang="zh-TW" altLang="en-US"/>
           </a:p>
@@ -1144,7 +2298,7 @@
           <p:cNvPr id="5" name="頁尾版面配置區 4">
             <a:extLst>
               <a:ext uri="{FF2B5EF4-FFF2-40B4-BE49-F238E27FC236}">
-                <a16:creationId xmlns:a16="http://schemas.microsoft.com/office/drawing/2014/main" id="{9C9DC25F-827C-4564-AD0E-7FD815D53AF7}"/>
+                <a16:creationId xmlns:a16="http://schemas.microsoft.com/office/drawing/2014/main" id="{F792EAFC-DE58-1918-5F30-32BB98CA47F0}"/>
               </a:ext>
             </a:extLst>
           </p:cNvPr>
@@ -1169,7 +2323,7 @@
           <p:cNvPr id="6" name="投影片編號版面配置區 5">
             <a:extLst>
               <a:ext uri="{FF2B5EF4-FFF2-40B4-BE49-F238E27FC236}">
-                <a16:creationId xmlns:a16="http://schemas.microsoft.com/office/drawing/2014/main" id="{8C0653A6-68AA-4213-8D62-EAF9243D6998}"/>
+                <a16:creationId xmlns:a16="http://schemas.microsoft.com/office/drawing/2014/main" id="{C14DED4B-C3E2-7352-8314-BDD7CE526987}"/>
               </a:ext>
             </a:extLst>
           </p:cNvPr>
@@ -1185,7 +2339,7 @@
           <a:bodyPr/>
           <a:lstStyle/>
           <a:p>
-            <a:fld id="{E31EC408-072F-4346-BD0A-D6AA5788A305}" type="slidenum">
+            <a:fld id="{9B3887EC-0C89-4BEA-9AE1-52834055F7A5}" type="slidenum">
               <a:rPr lang="zh-TW" altLang="en-US" smtClean="0"/>
               <a:t>‹#›</a:t>
             </a:fld>
@@ -1196,13 +2350,25 @@
     </p:spTree>
     <p:extLst>
       <p:ext uri="{BB962C8B-B14F-4D97-AF65-F5344CB8AC3E}">
-        <p14:creationId xmlns:p14="http://schemas.microsoft.com/office/powerpoint/2010/main" val="3126775509"/>
+        <p14:creationId xmlns:p14="http://schemas.microsoft.com/office/powerpoint/2010/main" val="3337625405"/>
       </p:ext>
     </p:extLst>
   </p:cSld>
   <p:clrMapOvr>
     <a:masterClrMapping/>
   </p:clrMapOvr>
+  <mc:AlternateContent xmlns:mc="http://schemas.openxmlformats.org/markup-compatibility/2006">
+    <mc:Choice xmlns:p159="http://schemas.microsoft.com/office/powerpoint/2015/09/main" Requires="p159">
+      <p:transition xmlns:p14="http://schemas.microsoft.com/office/powerpoint/2010/main" spd="slow" p14:dur="2000">
+        <p159:morph option="byObject"/>
+      </p:transition>
+    </mc:Choice>
+    <mc:Fallback>
+      <p:transition spd="slow">
+        <p:fade/>
+      </p:transition>
+    </mc:Fallback>
+  </mc:AlternateContent>
 </p:sldLayout>
 </file>
 
@@ -1228,7 +2394,7 @@
           <p:cNvPr id="2" name="標題 1">
             <a:extLst>
               <a:ext uri="{FF2B5EF4-FFF2-40B4-BE49-F238E27FC236}">
-                <a16:creationId xmlns:a16="http://schemas.microsoft.com/office/drawing/2014/main" id="{F8A74D77-9E6E-4FD1-97AD-0ADC1228B6AF}"/>
+                <a16:creationId xmlns:a16="http://schemas.microsoft.com/office/drawing/2014/main" id="{B9023FC0-3C30-7140-B8A0-71D52A82B6A1}"/>
               </a:ext>
             </a:extLst>
           </p:cNvPr>
@@ -1256,7 +2422,7 @@
           <p:cNvPr id="3" name="內容版面配置區 2">
             <a:extLst>
               <a:ext uri="{FF2B5EF4-FFF2-40B4-BE49-F238E27FC236}">
-                <a16:creationId xmlns:a16="http://schemas.microsoft.com/office/drawing/2014/main" id="{9FDE4E9B-689C-4373-B281-9636BE211982}"/>
+                <a16:creationId xmlns:a16="http://schemas.microsoft.com/office/drawing/2014/main" id="{3E0190E1-A656-3FC9-D8CD-6FD169DE5D38}"/>
               </a:ext>
             </a:extLst>
           </p:cNvPr>
@@ -1318,7 +2484,7 @@
           <p:cNvPr id="4" name="內容版面配置區 3">
             <a:extLst>
               <a:ext uri="{FF2B5EF4-FFF2-40B4-BE49-F238E27FC236}">
-                <a16:creationId xmlns:a16="http://schemas.microsoft.com/office/drawing/2014/main" id="{CD25EC10-0BDA-4ECA-AB8E-059AC3378E22}"/>
+                <a16:creationId xmlns:a16="http://schemas.microsoft.com/office/drawing/2014/main" id="{955DE48C-0411-D17A-4BF3-B002A2090925}"/>
               </a:ext>
             </a:extLst>
           </p:cNvPr>
@@ -1380,7 +2546,7 @@
           <p:cNvPr id="5" name="日期版面配置區 4">
             <a:extLst>
               <a:ext uri="{FF2B5EF4-FFF2-40B4-BE49-F238E27FC236}">
-                <a16:creationId xmlns:a16="http://schemas.microsoft.com/office/drawing/2014/main" id="{63DAF127-0983-4C38-869C-C0A513FA9147}"/>
+                <a16:creationId xmlns:a16="http://schemas.microsoft.com/office/drawing/2014/main" id="{ACCB53C1-E47A-798E-10AD-0B7E4E2E07CB}"/>
               </a:ext>
             </a:extLst>
           </p:cNvPr>
@@ -1396,9 +2562,9 @@
           <a:bodyPr/>
           <a:lstStyle/>
           <a:p>
-            <a:fld id="{C3C90D7E-32D6-4894-AE08-7BBB3E610FC9}" type="datetimeFigureOut">
+            <a:fld id="{458E591F-1D90-4A08-BEBB-9552D45ACD8D}" type="datetimeFigureOut">
               <a:rPr lang="zh-TW" altLang="en-US" smtClean="0"/>
-              <a:t>2024/9/16</a:t>
+              <a:t>2024/10/26</a:t>
             </a:fld>
             <a:endParaRPr lang="zh-TW" altLang="en-US"/>
           </a:p>
@@ -1409,7 +2575,7 @@
           <p:cNvPr id="6" name="頁尾版面配置區 5">
             <a:extLst>
               <a:ext uri="{FF2B5EF4-FFF2-40B4-BE49-F238E27FC236}">
-                <a16:creationId xmlns:a16="http://schemas.microsoft.com/office/drawing/2014/main" id="{E014CBA6-CCE3-4CF4-8E13-D895EDBD8F25}"/>
+                <a16:creationId xmlns:a16="http://schemas.microsoft.com/office/drawing/2014/main" id="{40B0A0CB-B7D5-0C87-7F7F-AF2DE05A116D}"/>
               </a:ext>
             </a:extLst>
           </p:cNvPr>
@@ -1434,7 +2600,7 @@
           <p:cNvPr id="7" name="投影片編號版面配置區 6">
             <a:extLst>
               <a:ext uri="{FF2B5EF4-FFF2-40B4-BE49-F238E27FC236}">
-                <a16:creationId xmlns:a16="http://schemas.microsoft.com/office/drawing/2014/main" id="{5CEAA8E5-79B3-445E-B8C3-29BD56CE6D7A}"/>
+                <a16:creationId xmlns:a16="http://schemas.microsoft.com/office/drawing/2014/main" id="{55C2BF69-708E-84EE-FB50-BDD71D036061}"/>
               </a:ext>
             </a:extLst>
           </p:cNvPr>
@@ -1450,7 +2616,7 @@
           <a:bodyPr/>
           <a:lstStyle/>
           <a:p>
-            <a:fld id="{E31EC408-072F-4346-BD0A-D6AA5788A305}" type="slidenum">
+            <a:fld id="{9B3887EC-0C89-4BEA-9AE1-52834055F7A5}" type="slidenum">
               <a:rPr lang="zh-TW" altLang="en-US" smtClean="0"/>
               <a:t>‹#›</a:t>
             </a:fld>
@@ -1461,13 +2627,25 @@
     </p:spTree>
     <p:extLst>
       <p:ext uri="{BB962C8B-B14F-4D97-AF65-F5344CB8AC3E}">
-        <p14:creationId xmlns:p14="http://schemas.microsoft.com/office/powerpoint/2010/main" val="3858213488"/>
+        <p14:creationId xmlns:p14="http://schemas.microsoft.com/office/powerpoint/2010/main" val="3110219252"/>
       </p:ext>
     </p:extLst>
   </p:cSld>
   <p:clrMapOvr>
     <a:masterClrMapping/>
   </p:clrMapOvr>
+  <mc:AlternateContent xmlns:mc="http://schemas.openxmlformats.org/markup-compatibility/2006">
+    <mc:Choice xmlns:p159="http://schemas.microsoft.com/office/powerpoint/2015/09/main" Requires="p159">
+      <p:transition xmlns:p14="http://schemas.microsoft.com/office/powerpoint/2010/main" spd="slow" p14:dur="2000">
+        <p159:morph option="byObject"/>
+      </p:transition>
+    </mc:Choice>
+    <mc:Fallback>
+      <p:transition spd="slow">
+        <p:fade/>
+      </p:transition>
+    </mc:Fallback>
+  </mc:AlternateContent>
 </p:sldLayout>
 </file>
 
@@ -1493,7 +2671,7 @@
           <p:cNvPr id="2" name="標題 1">
             <a:extLst>
               <a:ext uri="{FF2B5EF4-FFF2-40B4-BE49-F238E27FC236}">
-                <a16:creationId xmlns:a16="http://schemas.microsoft.com/office/drawing/2014/main" id="{A00F76B6-8DEC-4A74-A06A-BA0146321CD8}"/>
+                <a16:creationId xmlns:a16="http://schemas.microsoft.com/office/drawing/2014/main" id="{D84DF997-A7AB-6FB5-9BB5-5478A90C59EA}"/>
               </a:ext>
             </a:extLst>
           </p:cNvPr>
@@ -1526,7 +2704,7 @@
           <p:cNvPr id="3" name="文字版面配置區 2">
             <a:extLst>
               <a:ext uri="{FF2B5EF4-FFF2-40B4-BE49-F238E27FC236}">
-                <a16:creationId xmlns:a16="http://schemas.microsoft.com/office/drawing/2014/main" id="{EF00F5C5-99A7-4F16-855A-F170362659F7}"/>
+                <a16:creationId xmlns:a16="http://schemas.microsoft.com/office/drawing/2014/main" id="{4884F2CB-060A-4420-DECC-85D24FB44553}"/>
               </a:ext>
             </a:extLst>
           </p:cNvPr>
@@ -1597,7 +2775,7 @@
           <p:cNvPr id="4" name="內容版面配置區 3">
             <a:extLst>
               <a:ext uri="{FF2B5EF4-FFF2-40B4-BE49-F238E27FC236}">
-                <a16:creationId xmlns:a16="http://schemas.microsoft.com/office/drawing/2014/main" id="{6722BEB2-C9B4-4C14-8234-D17E84349984}"/>
+                <a16:creationId xmlns:a16="http://schemas.microsoft.com/office/drawing/2014/main" id="{A053B9F1-103A-FDFC-D3EA-BC63E9EA576F}"/>
               </a:ext>
             </a:extLst>
           </p:cNvPr>
@@ -1659,7 +2837,7 @@
           <p:cNvPr id="5" name="文字版面配置區 4">
             <a:extLst>
               <a:ext uri="{FF2B5EF4-FFF2-40B4-BE49-F238E27FC236}">
-                <a16:creationId xmlns:a16="http://schemas.microsoft.com/office/drawing/2014/main" id="{E4A41162-A0AC-4211-940F-4B92208F9B0E}"/>
+                <a16:creationId xmlns:a16="http://schemas.microsoft.com/office/drawing/2014/main" id="{F5B481A7-8255-4A43-C4D6-CEE42F61EAB8}"/>
               </a:ext>
             </a:extLst>
           </p:cNvPr>
@@ -1730,7 +2908,7 @@
           <p:cNvPr id="6" name="內容版面配置區 5">
             <a:extLst>
               <a:ext uri="{FF2B5EF4-FFF2-40B4-BE49-F238E27FC236}">
-                <a16:creationId xmlns:a16="http://schemas.microsoft.com/office/drawing/2014/main" id="{E8EA159A-F9D7-4F58-A7C3-6E5B65E42266}"/>
+                <a16:creationId xmlns:a16="http://schemas.microsoft.com/office/drawing/2014/main" id="{55F8401A-FA4D-9669-BCF6-A877550BBE1C}"/>
               </a:ext>
             </a:extLst>
           </p:cNvPr>
@@ -1792,7 +2970,7 @@
           <p:cNvPr id="7" name="日期版面配置區 6">
             <a:extLst>
               <a:ext uri="{FF2B5EF4-FFF2-40B4-BE49-F238E27FC236}">
-                <a16:creationId xmlns:a16="http://schemas.microsoft.com/office/drawing/2014/main" id="{AE973E80-9141-48B7-A9D7-605A4541768F}"/>
+                <a16:creationId xmlns:a16="http://schemas.microsoft.com/office/drawing/2014/main" id="{91A1482E-36C0-EEA6-E517-1F169D30686F}"/>
               </a:ext>
             </a:extLst>
           </p:cNvPr>
@@ -1808,9 +2986,9 @@
           <a:bodyPr/>
           <a:lstStyle/>
           <a:p>
-            <a:fld id="{C3C90D7E-32D6-4894-AE08-7BBB3E610FC9}" type="datetimeFigureOut">
+            <a:fld id="{458E591F-1D90-4A08-BEBB-9552D45ACD8D}" type="datetimeFigureOut">
               <a:rPr lang="zh-TW" altLang="en-US" smtClean="0"/>
-              <a:t>2024/9/16</a:t>
+              <a:t>2024/10/26</a:t>
             </a:fld>
             <a:endParaRPr lang="zh-TW" altLang="en-US"/>
           </a:p>
@@ -1821,7 +2999,7 @@
           <p:cNvPr id="8" name="頁尾版面配置區 7">
             <a:extLst>
               <a:ext uri="{FF2B5EF4-FFF2-40B4-BE49-F238E27FC236}">
-                <a16:creationId xmlns:a16="http://schemas.microsoft.com/office/drawing/2014/main" id="{6520B07A-79F8-43E7-8013-632DD2AED223}"/>
+                <a16:creationId xmlns:a16="http://schemas.microsoft.com/office/drawing/2014/main" id="{678EE907-0883-27E0-F00F-F851727801AF}"/>
               </a:ext>
             </a:extLst>
           </p:cNvPr>
@@ -1846,7 +3024,7 @@
           <p:cNvPr id="9" name="投影片編號版面配置區 8">
             <a:extLst>
               <a:ext uri="{FF2B5EF4-FFF2-40B4-BE49-F238E27FC236}">
-                <a16:creationId xmlns:a16="http://schemas.microsoft.com/office/drawing/2014/main" id="{3B997D8F-4F1C-4DE6-A82C-3E0C38ACAE96}"/>
+                <a16:creationId xmlns:a16="http://schemas.microsoft.com/office/drawing/2014/main" id="{569BF134-34F8-43F4-4959-5B2A919F5FD5}"/>
               </a:ext>
             </a:extLst>
           </p:cNvPr>
@@ -1862,7 +3040,7 @@
           <a:bodyPr/>
           <a:lstStyle/>
           <a:p>
-            <a:fld id="{E31EC408-072F-4346-BD0A-D6AA5788A305}" type="slidenum">
+            <a:fld id="{9B3887EC-0C89-4BEA-9AE1-52834055F7A5}" type="slidenum">
               <a:rPr lang="zh-TW" altLang="en-US" smtClean="0"/>
               <a:t>‹#›</a:t>
             </a:fld>
@@ -1873,13 +3051,25 @@
     </p:spTree>
     <p:extLst>
       <p:ext uri="{BB962C8B-B14F-4D97-AF65-F5344CB8AC3E}">
-        <p14:creationId xmlns:p14="http://schemas.microsoft.com/office/powerpoint/2010/main" val="3379995638"/>
+        <p14:creationId xmlns:p14="http://schemas.microsoft.com/office/powerpoint/2010/main" val="1298584693"/>
       </p:ext>
     </p:extLst>
   </p:cSld>
   <p:clrMapOvr>
     <a:masterClrMapping/>
   </p:clrMapOvr>
+  <mc:AlternateContent xmlns:mc="http://schemas.openxmlformats.org/markup-compatibility/2006">
+    <mc:Choice xmlns:p159="http://schemas.microsoft.com/office/powerpoint/2015/09/main" Requires="p159">
+      <p:transition xmlns:p14="http://schemas.microsoft.com/office/powerpoint/2010/main" spd="slow" p14:dur="2000">
+        <p159:morph option="byObject"/>
+      </p:transition>
+    </mc:Choice>
+    <mc:Fallback>
+      <p:transition spd="slow">
+        <p:fade/>
+      </p:transition>
+    </mc:Fallback>
+  </mc:AlternateContent>
 </p:sldLayout>
 </file>
 
@@ -1905,7 +3095,7 @@
           <p:cNvPr id="2" name="標題 1">
             <a:extLst>
               <a:ext uri="{FF2B5EF4-FFF2-40B4-BE49-F238E27FC236}">
-                <a16:creationId xmlns:a16="http://schemas.microsoft.com/office/drawing/2014/main" id="{6CE04611-FD10-429D-89AA-73C259B64293}"/>
+                <a16:creationId xmlns:a16="http://schemas.microsoft.com/office/drawing/2014/main" id="{C1659CBA-4CB8-8140-5561-97F6B6884147}"/>
               </a:ext>
             </a:extLst>
           </p:cNvPr>
@@ -1933,7 +3123,7 @@
           <p:cNvPr id="3" name="日期版面配置區 2">
             <a:extLst>
               <a:ext uri="{FF2B5EF4-FFF2-40B4-BE49-F238E27FC236}">
-                <a16:creationId xmlns:a16="http://schemas.microsoft.com/office/drawing/2014/main" id="{2D9009F3-A280-4DA8-ACC4-187DE2172BCA}"/>
+                <a16:creationId xmlns:a16="http://schemas.microsoft.com/office/drawing/2014/main" id="{9BD4C3BD-8813-6214-8026-664E15E547F4}"/>
               </a:ext>
             </a:extLst>
           </p:cNvPr>
@@ -1949,9 +3139,9 @@
           <a:bodyPr/>
           <a:lstStyle/>
           <a:p>
-            <a:fld id="{C3C90D7E-32D6-4894-AE08-7BBB3E610FC9}" type="datetimeFigureOut">
+            <a:fld id="{458E591F-1D90-4A08-BEBB-9552D45ACD8D}" type="datetimeFigureOut">
               <a:rPr lang="zh-TW" altLang="en-US" smtClean="0"/>
-              <a:t>2024/9/16</a:t>
+              <a:t>2024/10/26</a:t>
             </a:fld>
             <a:endParaRPr lang="zh-TW" altLang="en-US"/>
           </a:p>
@@ -1962,7 +3152,7 @@
           <p:cNvPr id="4" name="頁尾版面配置區 3">
             <a:extLst>
               <a:ext uri="{FF2B5EF4-FFF2-40B4-BE49-F238E27FC236}">
-                <a16:creationId xmlns:a16="http://schemas.microsoft.com/office/drawing/2014/main" id="{F8FD791E-F627-4DDB-AD69-F7639FDD1767}"/>
+                <a16:creationId xmlns:a16="http://schemas.microsoft.com/office/drawing/2014/main" id="{7C6469EB-BF88-8E48-77CE-ADD4FE051088}"/>
               </a:ext>
             </a:extLst>
           </p:cNvPr>
@@ -1987,7 +3177,7 @@
           <p:cNvPr id="5" name="投影片編號版面配置區 4">
             <a:extLst>
               <a:ext uri="{FF2B5EF4-FFF2-40B4-BE49-F238E27FC236}">
-                <a16:creationId xmlns:a16="http://schemas.microsoft.com/office/drawing/2014/main" id="{CE9C3C73-9A1B-4A20-B40C-BF8E0726E9AE}"/>
+                <a16:creationId xmlns:a16="http://schemas.microsoft.com/office/drawing/2014/main" id="{B0F79711-6FAF-E1DA-6F25-638F6AA9FA5A}"/>
               </a:ext>
             </a:extLst>
           </p:cNvPr>
@@ -2003,7 +3193,7 @@
           <a:bodyPr/>
           <a:lstStyle/>
           <a:p>
-            <a:fld id="{E31EC408-072F-4346-BD0A-D6AA5788A305}" type="slidenum">
+            <a:fld id="{9B3887EC-0C89-4BEA-9AE1-52834055F7A5}" type="slidenum">
               <a:rPr lang="zh-TW" altLang="en-US" smtClean="0"/>
               <a:t>‹#›</a:t>
             </a:fld>
@@ -2014,13 +3204,25 @@
     </p:spTree>
     <p:extLst>
       <p:ext uri="{BB962C8B-B14F-4D97-AF65-F5344CB8AC3E}">
-        <p14:creationId xmlns:p14="http://schemas.microsoft.com/office/powerpoint/2010/main" val="3116621787"/>
+        <p14:creationId xmlns:p14="http://schemas.microsoft.com/office/powerpoint/2010/main" val="2265359424"/>
       </p:ext>
     </p:extLst>
   </p:cSld>
   <p:clrMapOvr>
     <a:masterClrMapping/>
   </p:clrMapOvr>
+  <mc:AlternateContent xmlns:mc="http://schemas.openxmlformats.org/markup-compatibility/2006">
+    <mc:Choice xmlns:p159="http://schemas.microsoft.com/office/powerpoint/2015/09/main" Requires="p159">
+      <p:transition xmlns:p14="http://schemas.microsoft.com/office/powerpoint/2010/main" spd="slow" p14:dur="2000">
+        <p159:morph option="byObject"/>
+      </p:transition>
+    </mc:Choice>
+    <mc:Fallback>
+      <p:transition spd="slow">
+        <p:fade/>
+      </p:transition>
+    </mc:Fallback>
+  </mc:AlternateContent>
 </p:sldLayout>
 </file>
 
@@ -2046,7 +3248,7 @@
           <p:cNvPr id="2" name="日期版面配置區 1">
             <a:extLst>
               <a:ext uri="{FF2B5EF4-FFF2-40B4-BE49-F238E27FC236}">
-                <a16:creationId xmlns:a16="http://schemas.microsoft.com/office/drawing/2014/main" id="{1E1D8EED-F2A7-4221-9887-0DBB62EB3F80}"/>
+                <a16:creationId xmlns:a16="http://schemas.microsoft.com/office/drawing/2014/main" id="{9554B1F9-7208-4365-442A-3390486DE600}"/>
               </a:ext>
             </a:extLst>
           </p:cNvPr>
@@ -2062,9 +3264,9 @@
           <a:bodyPr/>
           <a:lstStyle/>
           <a:p>
-            <a:fld id="{C3C90D7E-32D6-4894-AE08-7BBB3E610FC9}" type="datetimeFigureOut">
+            <a:fld id="{458E591F-1D90-4A08-BEBB-9552D45ACD8D}" type="datetimeFigureOut">
               <a:rPr lang="zh-TW" altLang="en-US" smtClean="0"/>
-              <a:t>2024/9/16</a:t>
+              <a:t>2024/10/26</a:t>
             </a:fld>
             <a:endParaRPr lang="zh-TW" altLang="en-US"/>
           </a:p>
@@ -2075,7 +3277,7 @@
           <p:cNvPr id="3" name="頁尾版面配置區 2">
             <a:extLst>
               <a:ext uri="{FF2B5EF4-FFF2-40B4-BE49-F238E27FC236}">
-                <a16:creationId xmlns:a16="http://schemas.microsoft.com/office/drawing/2014/main" id="{10593B39-DC86-45A7-85EF-B4DB9C28DC80}"/>
+                <a16:creationId xmlns:a16="http://schemas.microsoft.com/office/drawing/2014/main" id="{D1AA7430-2091-0988-E1AD-6E42204A7EA6}"/>
               </a:ext>
             </a:extLst>
           </p:cNvPr>
@@ -2100,7 +3302,7 @@
           <p:cNvPr id="4" name="投影片編號版面配置區 3">
             <a:extLst>
               <a:ext uri="{FF2B5EF4-FFF2-40B4-BE49-F238E27FC236}">
-                <a16:creationId xmlns:a16="http://schemas.microsoft.com/office/drawing/2014/main" id="{3D9056B2-6966-4CAF-94D1-2295A737E168}"/>
+                <a16:creationId xmlns:a16="http://schemas.microsoft.com/office/drawing/2014/main" id="{6173530C-2C6C-F552-6768-122B53D74F59}"/>
               </a:ext>
             </a:extLst>
           </p:cNvPr>
@@ -2116,7 +3318,7 @@
           <a:bodyPr/>
           <a:lstStyle/>
           <a:p>
-            <a:fld id="{E31EC408-072F-4346-BD0A-D6AA5788A305}" type="slidenum">
+            <a:fld id="{9B3887EC-0C89-4BEA-9AE1-52834055F7A5}" type="slidenum">
               <a:rPr lang="zh-TW" altLang="en-US" smtClean="0"/>
               <a:t>‹#›</a:t>
             </a:fld>
@@ -2127,13 +3329,25 @@
     </p:spTree>
     <p:extLst>
       <p:ext uri="{BB962C8B-B14F-4D97-AF65-F5344CB8AC3E}">
-        <p14:creationId xmlns:p14="http://schemas.microsoft.com/office/powerpoint/2010/main" val="3887241942"/>
+        <p14:creationId xmlns:p14="http://schemas.microsoft.com/office/powerpoint/2010/main" val="2709965229"/>
       </p:ext>
     </p:extLst>
   </p:cSld>
   <p:clrMapOvr>
     <a:masterClrMapping/>
   </p:clrMapOvr>
+  <mc:AlternateContent xmlns:mc="http://schemas.openxmlformats.org/markup-compatibility/2006">
+    <mc:Choice xmlns:p159="http://schemas.microsoft.com/office/powerpoint/2015/09/main" Requires="p159">
+      <p:transition xmlns:p14="http://schemas.microsoft.com/office/powerpoint/2010/main" spd="slow" p14:dur="2000">
+        <p159:morph option="byObject"/>
+      </p:transition>
+    </mc:Choice>
+    <mc:Fallback>
+      <p:transition spd="slow">
+        <p:fade/>
+      </p:transition>
+    </mc:Fallback>
+  </mc:AlternateContent>
 </p:sldLayout>
 </file>
 
@@ -2159,7 +3373,7 @@
           <p:cNvPr id="2" name="標題 1">
             <a:extLst>
               <a:ext uri="{FF2B5EF4-FFF2-40B4-BE49-F238E27FC236}">
-                <a16:creationId xmlns:a16="http://schemas.microsoft.com/office/drawing/2014/main" id="{5C3076DF-D16B-4600-9550-96C6A8DD7F1A}"/>
+                <a16:creationId xmlns:a16="http://schemas.microsoft.com/office/drawing/2014/main" id="{AA4C8B7F-9AE3-BB4B-6584-A3B95F400A86}"/>
               </a:ext>
             </a:extLst>
           </p:cNvPr>
@@ -2196,7 +3410,7 @@
           <p:cNvPr id="3" name="內容版面配置區 2">
             <a:extLst>
               <a:ext uri="{FF2B5EF4-FFF2-40B4-BE49-F238E27FC236}">
-                <a16:creationId xmlns:a16="http://schemas.microsoft.com/office/drawing/2014/main" id="{9CD3D667-FDE5-4F5D-9495-588EC18912CE}"/>
+                <a16:creationId xmlns:a16="http://schemas.microsoft.com/office/drawing/2014/main" id="{4EB04FC1-62CA-7FB1-4E4C-199437ABC7A0}"/>
               </a:ext>
             </a:extLst>
           </p:cNvPr>
@@ -2286,7 +3500,7 @@
           <p:cNvPr id="4" name="文字版面配置區 3">
             <a:extLst>
               <a:ext uri="{FF2B5EF4-FFF2-40B4-BE49-F238E27FC236}">
-                <a16:creationId xmlns:a16="http://schemas.microsoft.com/office/drawing/2014/main" id="{22F511E7-BEEF-4F51-BA0E-52C1908D5608}"/>
+                <a16:creationId xmlns:a16="http://schemas.microsoft.com/office/drawing/2014/main" id="{27AB305F-8020-9810-FAD0-CE32E893C56C}"/>
               </a:ext>
             </a:extLst>
           </p:cNvPr>
@@ -2357,7 +3571,7 @@
           <p:cNvPr id="5" name="日期版面配置區 4">
             <a:extLst>
               <a:ext uri="{FF2B5EF4-FFF2-40B4-BE49-F238E27FC236}">
-                <a16:creationId xmlns:a16="http://schemas.microsoft.com/office/drawing/2014/main" id="{88060697-A92E-4178-A790-FCBB90D70573}"/>
+                <a16:creationId xmlns:a16="http://schemas.microsoft.com/office/drawing/2014/main" id="{99BDEB0A-6333-6F90-7AD0-89C1EFBB69A2}"/>
               </a:ext>
             </a:extLst>
           </p:cNvPr>
@@ -2373,9 +3587,9 @@
           <a:bodyPr/>
           <a:lstStyle/>
           <a:p>
-            <a:fld id="{C3C90D7E-32D6-4894-AE08-7BBB3E610FC9}" type="datetimeFigureOut">
+            <a:fld id="{458E591F-1D90-4A08-BEBB-9552D45ACD8D}" type="datetimeFigureOut">
               <a:rPr lang="zh-TW" altLang="en-US" smtClean="0"/>
-              <a:t>2024/9/16</a:t>
+              <a:t>2024/10/26</a:t>
             </a:fld>
             <a:endParaRPr lang="zh-TW" altLang="en-US"/>
           </a:p>
@@ -2386,7 +3600,7 @@
           <p:cNvPr id="6" name="頁尾版面配置區 5">
             <a:extLst>
               <a:ext uri="{FF2B5EF4-FFF2-40B4-BE49-F238E27FC236}">
-                <a16:creationId xmlns:a16="http://schemas.microsoft.com/office/drawing/2014/main" id="{2A8E3F57-A99A-4C4C-BF14-EE42AB99CE78}"/>
+                <a16:creationId xmlns:a16="http://schemas.microsoft.com/office/drawing/2014/main" id="{88F9FD75-F2B4-8593-3A4D-BF57637DE3A0}"/>
               </a:ext>
             </a:extLst>
           </p:cNvPr>
@@ -2411,7 +3625,7 @@
           <p:cNvPr id="7" name="投影片編號版面配置區 6">
             <a:extLst>
               <a:ext uri="{FF2B5EF4-FFF2-40B4-BE49-F238E27FC236}">
-                <a16:creationId xmlns:a16="http://schemas.microsoft.com/office/drawing/2014/main" id="{39234440-6924-48D7-AC1A-200D5946BCA9}"/>
+                <a16:creationId xmlns:a16="http://schemas.microsoft.com/office/drawing/2014/main" id="{5555EBEB-90E1-79A5-A1D7-EC129D93FB62}"/>
               </a:ext>
             </a:extLst>
           </p:cNvPr>
@@ -2427,7 +3641,7 @@
           <a:bodyPr/>
           <a:lstStyle/>
           <a:p>
-            <a:fld id="{E31EC408-072F-4346-BD0A-D6AA5788A305}" type="slidenum">
+            <a:fld id="{9B3887EC-0C89-4BEA-9AE1-52834055F7A5}" type="slidenum">
               <a:rPr lang="zh-TW" altLang="en-US" smtClean="0"/>
               <a:t>‹#›</a:t>
             </a:fld>
@@ -2438,13 +3652,25 @@
     </p:spTree>
     <p:extLst>
       <p:ext uri="{BB962C8B-B14F-4D97-AF65-F5344CB8AC3E}">
-        <p14:creationId xmlns:p14="http://schemas.microsoft.com/office/powerpoint/2010/main" val="2036183199"/>
+        <p14:creationId xmlns:p14="http://schemas.microsoft.com/office/powerpoint/2010/main" val="534504568"/>
       </p:ext>
     </p:extLst>
   </p:cSld>
   <p:clrMapOvr>
     <a:masterClrMapping/>
   </p:clrMapOvr>
+  <mc:AlternateContent xmlns:mc="http://schemas.openxmlformats.org/markup-compatibility/2006">
+    <mc:Choice xmlns:p159="http://schemas.microsoft.com/office/powerpoint/2015/09/main" Requires="p159">
+      <p:transition xmlns:p14="http://schemas.microsoft.com/office/powerpoint/2010/main" spd="slow" p14:dur="2000">
+        <p159:morph option="byObject"/>
+      </p:transition>
+    </mc:Choice>
+    <mc:Fallback>
+      <p:transition spd="slow">
+        <p:fade/>
+      </p:transition>
+    </mc:Fallback>
+  </mc:AlternateContent>
 </p:sldLayout>
 </file>
 
@@ -2470,7 +3696,7 @@
           <p:cNvPr id="2" name="標題 1">
             <a:extLst>
               <a:ext uri="{FF2B5EF4-FFF2-40B4-BE49-F238E27FC236}">
-                <a16:creationId xmlns:a16="http://schemas.microsoft.com/office/drawing/2014/main" id="{B2E81694-0B93-4D65-9DA3-21597478A96C}"/>
+                <a16:creationId xmlns:a16="http://schemas.microsoft.com/office/drawing/2014/main" id="{BFD34DC3-7FDA-1890-2FCE-FC677A1E31F7}"/>
               </a:ext>
             </a:extLst>
           </p:cNvPr>
@@ -2507,7 +3733,7 @@
           <p:cNvPr id="3" name="圖片版面配置區 2">
             <a:extLst>
               <a:ext uri="{FF2B5EF4-FFF2-40B4-BE49-F238E27FC236}">
-                <a16:creationId xmlns:a16="http://schemas.microsoft.com/office/drawing/2014/main" id="{23E4D718-8CB0-4334-BB8A-FB8B57D7CDC6}"/>
+                <a16:creationId xmlns:a16="http://schemas.microsoft.com/office/drawing/2014/main" id="{7F6CAA6C-E8DE-6933-C2DF-96DF03CF35EE}"/>
               </a:ext>
             </a:extLst>
           </p:cNvPr>
@@ -2574,7 +3800,7 @@
           <p:cNvPr id="4" name="文字版面配置區 3">
             <a:extLst>
               <a:ext uri="{FF2B5EF4-FFF2-40B4-BE49-F238E27FC236}">
-                <a16:creationId xmlns:a16="http://schemas.microsoft.com/office/drawing/2014/main" id="{0DC47463-53E7-4FE3-B60B-1657D11127BD}"/>
+                <a16:creationId xmlns:a16="http://schemas.microsoft.com/office/drawing/2014/main" id="{90F5F5ED-5287-ADBC-D3B5-305382C7DFCE}"/>
               </a:ext>
             </a:extLst>
           </p:cNvPr>
@@ -2645,7 +3871,7 @@
           <p:cNvPr id="5" name="日期版面配置區 4">
             <a:extLst>
               <a:ext uri="{FF2B5EF4-FFF2-40B4-BE49-F238E27FC236}">
-                <a16:creationId xmlns:a16="http://schemas.microsoft.com/office/drawing/2014/main" id="{28875DC5-6AFF-40C0-8C77-F81A0A3E1B0F}"/>
+                <a16:creationId xmlns:a16="http://schemas.microsoft.com/office/drawing/2014/main" id="{F15A63E8-B3F8-F162-4391-50CCCF8FF4B4}"/>
               </a:ext>
             </a:extLst>
           </p:cNvPr>
@@ -2661,9 +3887,9 @@
           <a:bodyPr/>
           <a:lstStyle/>
           <a:p>
-            <a:fld id="{C3C90D7E-32D6-4894-AE08-7BBB3E610FC9}" type="datetimeFigureOut">
+            <a:fld id="{458E591F-1D90-4A08-BEBB-9552D45ACD8D}" type="datetimeFigureOut">
               <a:rPr lang="zh-TW" altLang="en-US" smtClean="0"/>
-              <a:t>2024/9/16</a:t>
+              <a:t>2024/10/26</a:t>
             </a:fld>
             <a:endParaRPr lang="zh-TW" altLang="en-US"/>
           </a:p>
@@ -2674,7 +3900,7 @@
           <p:cNvPr id="6" name="頁尾版面配置區 5">
             <a:extLst>
               <a:ext uri="{FF2B5EF4-FFF2-40B4-BE49-F238E27FC236}">
-                <a16:creationId xmlns:a16="http://schemas.microsoft.com/office/drawing/2014/main" id="{24F8A973-6D07-4F0C-97A0-280FEFC238E0}"/>
+                <a16:creationId xmlns:a16="http://schemas.microsoft.com/office/drawing/2014/main" id="{EE51F9A6-3141-4956-1914-845E529DB73A}"/>
               </a:ext>
             </a:extLst>
           </p:cNvPr>
@@ -2699,7 +3925,7 @@
           <p:cNvPr id="7" name="投影片編號版面配置區 6">
             <a:extLst>
               <a:ext uri="{FF2B5EF4-FFF2-40B4-BE49-F238E27FC236}">
-                <a16:creationId xmlns:a16="http://schemas.microsoft.com/office/drawing/2014/main" id="{DB60BB1E-F41B-40F0-929B-5208374980BF}"/>
+                <a16:creationId xmlns:a16="http://schemas.microsoft.com/office/drawing/2014/main" id="{EC0C905B-4DBD-96CB-E912-CF09CE35ED63}"/>
               </a:ext>
             </a:extLst>
           </p:cNvPr>
@@ -2715,7 +3941,7 @@
           <a:bodyPr/>
           <a:lstStyle/>
           <a:p>
-            <a:fld id="{E31EC408-072F-4346-BD0A-D6AA5788A305}" type="slidenum">
+            <a:fld id="{9B3887EC-0C89-4BEA-9AE1-52834055F7A5}" type="slidenum">
               <a:rPr lang="zh-TW" altLang="en-US" smtClean="0"/>
               <a:t>‹#›</a:t>
             </a:fld>
@@ -2726,13 +3952,25 @@
     </p:spTree>
     <p:extLst>
       <p:ext uri="{BB962C8B-B14F-4D97-AF65-F5344CB8AC3E}">
-        <p14:creationId xmlns:p14="http://schemas.microsoft.com/office/powerpoint/2010/main" val="3148270851"/>
+        <p14:creationId xmlns:p14="http://schemas.microsoft.com/office/powerpoint/2010/main" val="495823409"/>
       </p:ext>
     </p:extLst>
   </p:cSld>
   <p:clrMapOvr>
     <a:masterClrMapping/>
   </p:clrMapOvr>
+  <mc:AlternateContent xmlns:mc="http://schemas.openxmlformats.org/markup-compatibility/2006">
+    <mc:Choice xmlns:p159="http://schemas.microsoft.com/office/powerpoint/2015/09/main" Requires="p159">
+      <p:transition xmlns:p14="http://schemas.microsoft.com/office/powerpoint/2010/main" spd="slow" p14:dur="2000">
+        <p159:morph option="byObject"/>
+      </p:transition>
+    </mc:Choice>
+    <mc:Fallback>
+      <p:transition spd="slow">
+        <p:fade/>
+      </p:transition>
+    </mc:Fallback>
+  </mc:AlternateContent>
 </p:sldLayout>
 </file>
 
@@ -2740,9 +3978,12 @@
 <p:sldMaster xmlns:a="http://schemas.openxmlformats.org/drawingml/2006/main" xmlns:r="http://schemas.openxmlformats.org/officeDocument/2006/relationships" xmlns:p="http://schemas.openxmlformats.org/presentationml/2006/main">
   <p:cSld>
     <p:bg>
-      <p:bgRef idx="1001">
-        <a:schemeClr val="bg1"/>
-      </p:bgRef>
+      <p:bgPr>
+        <a:solidFill>
+          <a:srgbClr val="2D2D2D"/>
+        </a:solidFill>
+        <a:effectLst/>
+      </p:bgPr>
     </p:bg>
     <p:spTree>
       <p:nvGrpSpPr>
@@ -2763,7 +4004,7 @@
           <p:cNvPr id="2" name="標題版面配置區 1">
             <a:extLst>
               <a:ext uri="{FF2B5EF4-FFF2-40B4-BE49-F238E27FC236}">
-                <a16:creationId xmlns:a16="http://schemas.microsoft.com/office/drawing/2014/main" id="{B8575AAC-624C-4B52-ABD4-699B1E35D2CF}"/>
+                <a16:creationId xmlns:a16="http://schemas.microsoft.com/office/drawing/2014/main" id="{4953CC2A-8527-D211-F47B-13F5DB814443}"/>
               </a:ext>
             </a:extLst>
           </p:cNvPr>
@@ -2801,7 +4042,7 @@
           <p:cNvPr id="3" name="文字版面配置區 2">
             <a:extLst>
               <a:ext uri="{FF2B5EF4-FFF2-40B4-BE49-F238E27FC236}">
-                <a16:creationId xmlns:a16="http://schemas.microsoft.com/office/drawing/2014/main" id="{76722991-C57D-471F-8271-C419A1CFB074}"/>
+                <a16:creationId xmlns:a16="http://schemas.microsoft.com/office/drawing/2014/main" id="{59099570-F97F-306D-B825-877E0B73AE99}"/>
               </a:ext>
             </a:extLst>
           </p:cNvPr>
@@ -2868,7 +4109,7 @@
           <p:cNvPr id="4" name="日期版面配置區 3">
             <a:extLst>
               <a:ext uri="{FF2B5EF4-FFF2-40B4-BE49-F238E27FC236}">
-                <a16:creationId xmlns:a16="http://schemas.microsoft.com/office/drawing/2014/main" id="{85C839DD-8CBF-4E23-A0C7-7C039E950BB8}"/>
+                <a16:creationId xmlns:a16="http://schemas.microsoft.com/office/drawing/2014/main" id="{5B1C4C26-2CBB-BFAE-E369-C9A5AFD9B7E5}"/>
               </a:ext>
             </a:extLst>
           </p:cNvPr>
@@ -2902,9 +4143,9 @@
             </a:lvl1pPr>
           </a:lstStyle>
           <a:p>
-            <a:fld id="{C3C90D7E-32D6-4894-AE08-7BBB3E610FC9}" type="datetimeFigureOut">
+            <a:fld id="{458E591F-1D90-4A08-BEBB-9552D45ACD8D}" type="datetimeFigureOut">
               <a:rPr lang="zh-TW" altLang="en-US" smtClean="0"/>
-              <a:t>2024/9/16</a:t>
+              <a:t>2024/10/26</a:t>
             </a:fld>
             <a:endParaRPr lang="zh-TW" altLang="en-US"/>
           </a:p>
@@ -2915,7 +4156,7 @@
           <p:cNvPr id="5" name="頁尾版面配置區 4">
             <a:extLst>
               <a:ext uri="{FF2B5EF4-FFF2-40B4-BE49-F238E27FC236}">
-                <a16:creationId xmlns:a16="http://schemas.microsoft.com/office/drawing/2014/main" id="{12802D8A-77D4-418C-8190-43B6ADED2131}"/>
+                <a16:creationId xmlns:a16="http://schemas.microsoft.com/office/drawing/2014/main" id="{2923CF56-8EBF-BDAE-AAC7-01B025AEE4D2}"/>
               </a:ext>
             </a:extLst>
           </p:cNvPr>
@@ -2958,7 +4199,7 @@
           <p:cNvPr id="6" name="投影片編號版面配置區 5">
             <a:extLst>
               <a:ext uri="{FF2B5EF4-FFF2-40B4-BE49-F238E27FC236}">
-                <a16:creationId xmlns:a16="http://schemas.microsoft.com/office/drawing/2014/main" id="{7072B55E-2BE2-4AF4-AFF8-2A716F492F1C}"/>
+                <a16:creationId xmlns:a16="http://schemas.microsoft.com/office/drawing/2014/main" id="{68F161F2-86AD-25C6-4AC1-E4054F71329D}"/>
               </a:ext>
             </a:extLst>
           </p:cNvPr>
@@ -2992,7 +4233,7 @@
             </a:lvl1pPr>
           </a:lstStyle>
           <a:p>
-            <a:fld id="{E31EC408-072F-4346-BD0A-D6AA5788A305}" type="slidenum">
+            <a:fld id="{9B3887EC-0C89-4BEA-9AE1-52834055F7A5}" type="slidenum">
               <a:rPr lang="zh-TW" altLang="en-US" smtClean="0"/>
               <a:t>‹#›</a:t>
             </a:fld>
@@ -3003,7 +4244,7 @@
     </p:spTree>
     <p:extLst>
       <p:ext uri="{BB962C8B-B14F-4D97-AF65-F5344CB8AC3E}">
-        <p14:creationId xmlns:p14="http://schemas.microsoft.com/office/powerpoint/2010/main" val="2016052060"/>
+        <p14:creationId xmlns:p14="http://schemas.microsoft.com/office/powerpoint/2010/main" val="2655083221"/>
       </p:ext>
     </p:extLst>
   </p:cSld>
@@ -3021,6 +4262,18 @@
     <p:sldLayoutId id="2147483658" r:id="rId10"/>
     <p:sldLayoutId id="2147483659" r:id="rId11"/>
   </p:sldLayoutIdLst>
+  <mc:AlternateContent xmlns:mc="http://schemas.openxmlformats.org/markup-compatibility/2006">
+    <mc:Choice xmlns:p159="http://schemas.microsoft.com/office/powerpoint/2015/09/main" Requires="p159">
+      <p:transition xmlns:p14="http://schemas.microsoft.com/office/powerpoint/2010/main" spd="slow" p14:dur="2000">
+        <p159:morph option="byObject"/>
+      </p:transition>
+    </mc:Choice>
+    <mc:Fallback>
+      <p:transition spd="slow">
+        <p:fade/>
+      </p:transition>
+    </mc:Fallback>
+  </mc:AlternateContent>
   <p:txStyles>
     <p:titleStyle>
       <a:lvl1pPr algn="l" defTabSz="914400" rtl="0" eaLnBrk="1" latinLnBrk="0" hangingPunct="1">
@@ -3309,7 +4562,13 @@
   <p:cSld>
     <p:spTree>
       <p:nvGrpSpPr>
-        <p:cNvPr id="1" name=""/>
+        <p:cNvPr id="1" name="">
+          <a:extLst>
+            <a:ext uri="{FF2B5EF4-FFF2-40B4-BE49-F238E27FC236}">
+              <a16:creationId xmlns:a16="http://schemas.microsoft.com/office/drawing/2014/main" id="{1520E96B-F950-F8D6-ADA6-178BAEA219BE}"/>
+            </a:ext>
+          </a:extLst>
+        </p:cNvPr>
         <p:cNvGrpSpPr/>
         <p:nvPr/>
       </p:nvGrpSpPr>
@@ -3321,66 +4580,1144 @@
           <a:chExt cx="0" cy="0"/>
         </a:xfrm>
       </p:grpSpPr>
-      <p:sp>
-        <p:nvSpPr>
-          <p:cNvPr id="2" name="標題 1">
-            <a:extLst>
-              <a:ext uri="{FF2B5EF4-FFF2-40B4-BE49-F238E27FC236}">
-                <a16:creationId xmlns:a16="http://schemas.microsoft.com/office/drawing/2014/main" id="{32532283-9F93-4E44-8138-32796965361F}"/>
-              </a:ext>
-            </a:extLst>
-          </p:cNvPr>
-          <p:cNvSpPr>
-            <a:spLocks noGrp="1"/>
-          </p:cNvSpPr>
-          <p:nvPr>
-            <p:ph type="ctrTitle"/>
-          </p:nvPr>
-        </p:nvSpPr>
-        <p:spPr/>
-        <p:txBody>
-          <a:bodyPr/>
-          <a:lstStyle/>
-          <a:p>
-            <a:endParaRPr lang="zh-TW" altLang="en-US"/>
-          </a:p>
-        </p:txBody>
-      </p:sp>
-      <p:sp>
-        <p:nvSpPr>
-          <p:cNvPr id="3" name="副標題 2">
-            <a:extLst>
-              <a:ext uri="{FF2B5EF4-FFF2-40B4-BE49-F238E27FC236}">
-                <a16:creationId xmlns:a16="http://schemas.microsoft.com/office/drawing/2014/main" id="{8C946F38-524D-4B98-B9CB-80AEE57E455A}"/>
-              </a:ext>
-            </a:extLst>
-          </p:cNvPr>
-          <p:cNvSpPr>
-            <a:spLocks noGrp="1"/>
-          </p:cNvSpPr>
-          <p:nvPr>
-            <p:ph type="subTitle" idx="1"/>
-          </p:nvPr>
-        </p:nvSpPr>
-        <p:spPr/>
-        <p:txBody>
-          <a:bodyPr/>
-          <a:lstStyle/>
-          <a:p>
-            <a:endParaRPr lang="zh-TW" altLang="en-US"/>
+      <p:pic>
+        <p:nvPicPr>
+          <p:cNvPr id="12" name="圖片 11">
+            <a:extLst>
+              <a:ext uri="{FF2B5EF4-FFF2-40B4-BE49-F238E27FC236}">
+                <a16:creationId xmlns:a16="http://schemas.microsoft.com/office/drawing/2014/main" id="{D875CBA2-27DC-2C25-CFE2-630AB785F7E7}"/>
+              </a:ext>
+            </a:extLst>
+          </p:cNvPr>
+          <p:cNvPicPr>
+            <a:picLocks noChangeAspect="1"/>
+          </p:cNvPicPr>
+          <p:nvPr/>
+        </p:nvPicPr>
+        <p:blipFill>
+          <a:blip r:embed="rId3"/>
+          <a:stretch>
+            <a:fillRect/>
+          </a:stretch>
+        </p:blipFill>
+        <p:spPr>
+          <a:xfrm>
+            <a:off x="0" y="1"/>
+            <a:ext cx="12192000" cy="6857999"/>
+          </a:xfrm>
+          <a:prstGeom prst="rect">
+            <a:avLst/>
+          </a:prstGeom>
+        </p:spPr>
+      </p:pic>
+      <p:sp>
+        <p:nvSpPr>
+          <p:cNvPr id="2" name="文字方塊 1">
+            <a:extLst>
+              <a:ext uri="{FF2B5EF4-FFF2-40B4-BE49-F238E27FC236}">
+                <a16:creationId xmlns:a16="http://schemas.microsoft.com/office/drawing/2014/main" id="{7F6252D3-1D16-EC2F-6C51-FA22B346A8C4}"/>
+              </a:ext>
+            </a:extLst>
+          </p:cNvPr>
+          <p:cNvSpPr txBox="1"/>
+          <p:nvPr/>
+        </p:nvSpPr>
+        <p:spPr>
+          <a:xfrm>
+            <a:off x="2659635" y="2322365"/>
+            <a:ext cx="4588142" cy="1200329"/>
+          </a:xfrm>
+          <a:prstGeom prst="rect">
+            <a:avLst/>
+          </a:prstGeom>
+          <a:noFill/>
+        </p:spPr>
+        <p:txBody>
+          <a:bodyPr wrap="square" rtlCol="0">
+            <a:spAutoFit/>
+          </a:bodyPr>
+          <a:lstStyle/>
+          <a:p>
+            <a:pPr algn="ctr"/>
+            <a:r>
+              <a:rPr lang="zh-TW" altLang="en-US" sz="7200" dirty="0">
+                <a:solidFill>
+                  <a:srgbClr val="BDACD5"/>
+                </a:solidFill>
+                <a:latin typeface="宅在家麥克筆" panose="02020300000000000000" pitchFamily="18" charset="-120"/>
+                <a:ea typeface="宅在家麥克筆" panose="02020300000000000000" pitchFamily="18" charset="-120"/>
+                <a:cs typeface="宅在家麥克筆" panose="02020300000000000000" pitchFamily="18" charset="-120"/>
+              </a:rPr>
+              <a:t>追尋自由</a:t>
+            </a:r>
           </a:p>
         </p:txBody>
       </p:sp>
     </p:spTree>
     <p:extLst>
       <p:ext uri="{BB962C8B-B14F-4D97-AF65-F5344CB8AC3E}">
-        <p14:creationId xmlns:p14="http://schemas.microsoft.com/office/powerpoint/2010/main" val="1328321055"/>
+        <p14:creationId xmlns:p14="http://schemas.microsoft.com/office/powerpoint/2010/main" val="253017904"/>
       </p:ext>
     </p:extLst>
   </p:cSld>
   <p:clrMapOvr>
     <a:masterClrMapping/>
   </p:clrMapOvr>
+  <mc:AlternateContent xmlns:mc="http://schemas.openxmlformats.org/markup-compatibility/2006">
+    <mc:Choice xmlns:p159="http://schemas.microsoft.com/office/powerpoint/2015/09/main" Requires="p159">
+      <p:transition xmlns:p14="http://schemas.microsoft.com/office/powerpoint/2010/main" spd="slow" p14:dur="2000">
+        <p159:morph option="byObject"/>
+      </p:transition>
+    </mc:Choice>
+    <mc:Fallback>
+      <p:transition spd="slow">
+        <p:fade/>
+      </p:transition>
+    </mc:Fallback>
+  </mc:AlternateContent>
+</p:sld>
+</file>
+
+<file path=ppt/slides/slide2.xml><?xml version="1.0" encoding="utf-8"?>
+<p:sld xmlns:a="http://schemas.openxmlformats.org/drawingml/2006/main" xmlns:r="http://schemas.openxmlformats.org/officeDocument/2006/relationships" xmlns:p="http://schemas.openxmlformats.org/presentationml/2006/main">
+  <p:cSld>
+    <p:spTree>
+      <p:nvGrpSpPr>
+        <p:cNvPr id="1" name="">
+          <a:extLst>
+            <a:ext uri="{FF2B5EF4-FFF2-40B4-BE49-F238E27FC236}">
+              <a16:creationId xmlns:a16="http://schemas.microsoft.com/office/drawing/2014/main" id="{DAD53376-93F0-3739-06D3-8B5907EED51C}"/>
+            </a:ext>
+          </a:extLst>
+        </p:cNvPr>
+        <p:cNvGrpSpPr/>
+        <p:nvPr/>
+      </p:nvGrpSpPr>
+      <p:grpSpPr>
+        <a:xfrm>
+          <a:off x="0" y="0"/>
+          <a:ext cx="0" cy="0"/>
+          <a:chOff x="0" y="0"/>
+          <a:chExt cx="0" cy="0"/>
+        </a:xfrm>
+      </p:grpSpPr>
+      <p:pic>
+        <p:nvPicPr>
+          <p:cNvPr id="4" name="圖片 3">
+            <a:extLst>
+              <a:ext uri="{FF2B5EF4-FFF2-40B4-BE49-F238E27FC236}">
+                <a16:creationId xmlns:a16="http://schemas.microsoft.com/office/drawing/2014/main" id="{04524611-2442-FEFB-0018-90A96AA8ED6E}"/>
+              </a:ext>
+            </a:extLst>
+          </p:cNvPr>
+          <p:cNvPicPr>
+            <a:picLocks noChangeAspect="1"/>
+          </p:cNvPicPr>
+          <p:nvPr/>
+        </p:nvPicPr>
+        <p:blipFill>
+          <a:blip r:embed="rId3"/>
+          <a:srcRect/>
+          <a:stretch/>
+        </p:blipFill>
+        <p:spPr>
+          <a:xfrm>
+            <a:off x="2321278" y="290102"/>
+            <a:ext cx="5264856" cy="5264856"/>
+          </a:xfrm>
+          <a:prstGeom prst="rect">
+            <a:avLst/>
+          </a:prstGeom>
+        </p:spPr>
+      </p:pic>
+      <p:pic>
+        <p:nvPicPr>
+          <p:cNvPr id="12" name="圖片 11">
+            <a:extLst>
+              <a:ext uri="{FF2B5EF4-FFF2-40B4-BE49-F238E27FC236}">
+                <a16:creationId xmlns:a16="http://schemas.microsoft.com/office/drawing/2014/main" id="{7E856704-8900-BF5D-AE18-7308DA19EDB3}"/>
+              </a:ext>
+            </a:extLst>
+          </p:cNvPr>
+          <p:cNvPicPr>
+            <a:picLocks noChangeAspect="1"/>
+          </p:cNvPicPr>
+          <p:nvPr/>
+        </p:nvPicPr>
+        <p:blipFill>
+          <a:blip r:embed="rId4"/>
+          <a:stretch>
+            <a:fillRect/>
+          </a:stretch>
+        </p:blipFill>
+        <p:spPr>
+          <a:xfrm>
+            <a:off x="0" y="1"/>
+            <a:ext cx="12192000" cy="6857999"/>
+          </a:xfrm>
+          <a:prstGeom prst="rect">
+            <a:avLst/>
+          </a:prstGeom>
+        </p:spPr>
+      </p:pic>
+      <p:sp>
+        <p:nvSpPr>
+          <p:cNvPr id="2" name="文字方塊 1">
+            <a:extLst>
+              <a:ext uri="{FF2B5EF4-FFF2-40B4-BE49-F238E27FC236}">
+                <a16:creationId xmlns:a16="http://schemas.microsoft.com/office/drawing/2014/main" id="{BBAD8C21-B5D7-1BCB-4EE5-F2E5CD81EA99}"/>
+              </a:ext>
+            </a:extLst>
+          </p:cNvPr>
+          <p:cNvSpPr txBox="1"/>
+          <p:nvPr/>
+        </p:nvSpPr>
+        <p:spPr>
+          <a:xfrm>
+            <a:off x="740214" y="5736900"/>
+            <a:ext cx="1415772" cy="830997"/>
+          </a:xfrm>
+          <a:prstGeom prst="rect">
+            <a:avLst/>
+          </a:prstGeom>
+          <a:noFill/>
+        </p:spPr>
+        <p:txBody>
+          <a:bodyPr wrap="none" rtlCol="0">
+            <a:spAutoFit/>
+          </a:bodyPr>
+          <a:lstStyle/>
+          <a:p>
+            <a:r>
+              <a:rPr lang="zh-TW" altLang="en-US" sz="4800" dirty="0">
+                <a:solidFill>
+                  <a:srgbClr val="BDACD5"/>
+                </a:solidFill>
+                <a:latin typeface="宅在家麥克筆" panose="02020300000000000000" pitchFamily="18" charset="-120"/>
+                <a:ea typeface="宅在家麥克筆" panose="02020300000000000000" pitchFamily="18" charset="-120"/>
+                <a:cs typeface="宅在家麥克筆" panose="02020300000000000000" pitchFamily="18" charset="-120"/>
+              </a:rPr>
+              <a:t>目標</a:t>
+            </a:r>
+          </a:p>
+        </p:txBody>
+      </p:sp>
+    </p:spTree>
+    <p:extLst>
+      <p:ext uri="{BB962C8B-B14F-4D97-AF65-F5344CB8AC3E}">
+        <p14:creationId xmlns:p14="http://schemas.microsoft.com/office/powerpoint/2010/main" val="2595096296"/>
+      </p:ext>
+    </p:extLst>
+  </p:cSld>
+  <p:clrMapOvr>
+    <a:masterClrMapping/>
+  </p:clrMapOvr>
+  <mc:AlternateContent xmlns:mc="http://schemas.openxmlformats.org/markup-compatibility/2006">
+    <mc:Choice xmlns:p159="http://schemas.microsoft.com/office/powerpoint/2015/09/main" Requires="p159">
+      <p:transition xmlns:p14="http://schemas.microsoft.com/office/powerpoint/2010/main" spd="slow" p14:dur="2000">
+        <p159:morph option="byObject"/>
+      </p:transition>
+    </mc:Choice>
+    <mc:Fallback>
+      <p:transition spd="slow">
+        <p:fade/>
+      </p:transition>
+    </mc:Fallback>
+  </mc:AlternateContent>
+</p:sld>
+</file>
+
+<file path=ppt/slides/slide3.xml><?xml version="1.0" encoding="utf-8"?>
+<p:sld xmlns:a="http://schemas.openxmlformats.org/drawingml/2006/main" xmlns:r="http://schemas.openxmlformats.org/officeDocument/2006/relationships" xmlns:p="http://schemas.openxmlformats.org/presentationml/2006/main">
+  <p:cSld>
+    <p:spTree>
+      <p:nvGrpSpPr>
+        <p:cNvPr id="1" name="">
+          <a:extLst>
+            <a:ext uri="{FF2B5EF4-FFF2-40B4-BE49-F238E27FC236}">
+              <a16:creationId xmlns:a16="http://schemas.microsoft.com/office/drawing/2014/main" id="{C6FF665C-3827-CBFB-B695-337031E93B2A}"/>
+            </a:ext>
+          </a:extLst>
+        </p:cNvPr>
+        <p:cNvGrpSpPr/>
+        <p:nvPr/>
+      </p:nvGrpSpPr>
+      <p:grpSpPr>
+        <a:xfrm>
+          <a:off x="0" y="0"/>
+          <a:ext cx="0" cy="0"/>
+          <a:chOff x="0" y="0"/>
+          <a:chExt cx="0" cy="0"/>
+        </a:xfrm>
+      </p:grpSpPr>
+      <p:pic>
+        <p:nvPicPr>
+          <p:cNvPr id="3" name="圖片 2">
+            <a:extLst>
+              <a:ext uri="{FF2B5EF4-FFF2-40B4-BE49-F238E27FC236}">
+                <a16:creationId xmlns:a16="http://schemas.microsoft.com/office/drawing/2014/main" id="{F431B232-59C9-7FF7-3A7A-2EEED385CC11}"/>
+              </a:ext>
+            </a:extLst>
+          </p:cNvPr>
+          <p:cNvPicPr>
+            <a:picLocks noChangeAspect="1"/>
+          </p:cNvPicPr>
+          <p:nvPr/>
+        </p:nvPicPr>
+        <p:blipFill>
+          <a:blip r:embed="rId3"/>
+          <a:srcRect/>
+          <a:stretch/>
+        </p:blipFill>
+        <p:spPr>
+          <a:xfrm>
+            <a:off x="2321278" y="290102"/>
+            <a:ext cx="5264856" cy="5264856"/>
+          </a:xfrm>
+          <a:prstGeom prst="rect">
+            <a:avLst/>
+          </a:prstGeom>
+        </p:spPr>
+      </p:pic>
+      <p:pic>
+        <p:nvPicPr>
+          <p:cNvPr id="12" name="圖片 11">
+            <a:extLst>
+              <a:ext uri="{FF2B5EF4-FFF2-40B4-BE49-F238E27FC236}">
+                <a16:creationId xmlns:a16="http://schemas.microsoft.com/office/drawing/2014/main" id="{DFAFD443-99A6-F384-5C7B-6E7548C49B40}"/>
+              </a:ext>
+            </a:extLst>
+          </p:cNvPr>
+          <p:cNvPicPr>
+            <a:picLocks noChangeAspect="1"/>
+          </p:cNvPicPr>
+          <p:nvPr/>
+        </p:nvPicPr>
+        <p:blipFill>
+          <a:blip r:embed="rId4"/>
+          <a:stretch>
+            <a:fillRect/>
+          </a:stretch>
+        </p:blipFill>
+        <p:spPr>
+          <a:xfrm>
+            <a:off x="0" y="1"/>
+            <a:ext cx="12192000" cy="6857999"/>
+          </a:xfrm>
+          <a:prstGeom prst="rect">
+            <a:avLst/>
+          </a:prstGeom>
+        </p:spPr>
+      </p:pic>
+      <p:sp>
+        <p:nvSpPr>
+          <p:cNvPr id="2" name="文字方塊 1">
+            <a:extLst>
+              <a:ext uri="{FF2B5EF4-FFF2-40B4-BE49-F238E27FC236}">
+                <a16:creationId xmlns:a16="http://schemas.microsoft.com/office/drawing/2014/main" id="{4160361B-4F44-B8E9-CF3A-BDCD182C967D}"/>
+              </a:ext>
+            </a:extLst>
+          </p:cNvPr>
+          <p:cNvSpPr txBox="1"/>
+          <p:nvPr/>
+        </p:nvSpPr>
+        <p:spPr>
+          <a:xfrm>
+            <a:off x="740214" y="5736900"/>
+            <a:ext cx="1415772" cy="830997"/>
+          </a:xfrm>
+          <a:prstGeom prst="rect">
+            <a:avLst/>
+          </a:prstGeom>
+          <a:noFill/>
+        </p:spPr>
+        <p:txBody>
+          <a:bodyPr wrap="none" rtlCol="0">
+            <a:spAutoFit/>
+          </a:bodyPr>
+          <a:lstStyle/>
+          <a:p>
+            <a:r>
+              <a:rPr lang="zh-TW" altLang="en-US" sz="4800" dirty="0">
+                <a:solidFill>
+                  <a:srgbClr val="BDACD5"/>
+                </a:solidFill>
+                <a:latin typeface="宅在家麥克筆" panose="02020300000000000000" pitchFamily="18" charset="-120"/>
+                <a:ea typeface="宅在家麥克筆" panose="02020300000000000000" pitchFamily="18" charset="-120"/>
+                <a:cs typeface="宅在家麥克筆" panose="02020300000000000000" pitchFamily="18" charset="-120"/>
+              </a:rPr>
+              <a:t>阻礙</a:t>
+            </a:r>
+          </a:p>
+        </p:txBody>
+      </p:sp>
+    </p:spTree>
+    <p:extLst>
+      <p:ext uri="{BB962C8B-B14F-4D97-AF65-F5344CB8AC3E}">
+        <p14:creationId xmlns:p14="http://schemas.microsoft.com/office/powerpoint/2010/main" val="2208124858"/>
+      </p:ext>
+    </p:extLst>
+  </p:cSld>
+  <p:clrMapOvr>
+    <a:masterClrMapping/>
+  </p:clrMapOvr>
+  <mc:AlternateContent xmlns:mc="http://schemas.openxmlformats.org/markup-compatibility/2006">
+    <mc:Choice xmlns:p159="http://schemas.microsoft.com/office/powerpoint/2015/09/main" Requires="p159">
+      <p:transition xmlns:p14="http://schemas.microsoft.com/office/powerpoint/2010/main" spd="slow" p14:dur="2000">
+        <p159:morph option="byObject"/>
+      </p:transition>
+    </mc:Choice>
+    <mc:Fallback>
+      <p:transition spd="slow">
+        <p:fade/>
+      </p:transition>
+    </mc:Fallback>
+  </mc:AlternateContent>
+</p:sld>
+</file>
+
+<file path=ppt/slides/slide4.xml><?xml version="1.0" encoding="utf-8"?>
+<p:sld xmlns:a="http://schemas.openxmlformats.org/drawingml/2006/main" xmlns:r="http://schemas.openxmlformats.org/officeDocument/2006/relationships" xmlns:p="http://schemas.openxmlformats.org/presentationml/2006/main">
+  <p:cSld>
+    <p:spTree>
+      <p:nvGrpSpPr>
+        <p:cNvPr id="1" name="">
+          <a:extLst>
+            <a:ext uri="{FF2B5EF4-FFF2-40B4-BE49-F238E27FC236}">
+              <a16:creationId xmlns:a16="http://schemas.microsoft.com/office/drawing/2014/main" id="{9FB52777-B9B2-F10C-8025-DF4670B61B89}"/>
+            </a:ext>
+          </a:extLst>
+        </p:cNvPr>
+        <p:cNvGrpSpPr/>
+        <p:nvPr/>
+      </p:nvGrpSpPr>
+      <p:grpSpPr>
+        <a:xfrm>
+          <a:off x="0" y="0"/>
+          <a:ext cx="0" cy="0"/>
+          <a:chOff x="0" y="0"/>
+          <a:chExt cx="0" cy="0"/>
+        </a:xfrm>
+      </p:grpSpPr>
+      <p:pic>
+        <p:nvPicPr>
+          <p:cNvPr id="3" name="圖片 2">
+            <a:extLst>
+              <a:ext uri="{FF2B5EF4-FFF2-40B4-BE49-F238E27FC236}">
+                <a16:creationId xmlns:a16="http://schemas.microsoft.com/office/drawing/2014/main" id="{95535C8C-B4B8-494C-3DBC-9CC371C05E8F}"/>
+              </a:ext>
+            </a:extLst>
+          </p:cNvPr>
+          <p:cNvPicPr>
+            <a:picLocks noChangeAspect="1"/>
+          </p:cNvPicPr>
+          <p:nvPr/>
+        </p:nvPicPr>
+        <p:blipFill>
+          <a:blip r:embed="rId3"/>
+          <a:srcRect/>
+          <a:stretch/>
+        </p:blipFill>
+        <p:spPr>
+          <a:xfrm>
+            <a:off x="2321278" y="290102"/>
+            <a:ext cx="5264856" cy="5264856"/>
+          </a:xfrm>
+          <a:prstGeom prst="rect">
+            <a:avLst/>
+          </a:prstGeom>
+        </p:spPr>
+      </p:pic>
+      <p:pic>
+        <p:nvPicPr>
+          <p:cNvPr id="12" name="圖片 11">
+            <a:extLst>
+              <a:ext uri="{FF2B5EF4-FFF2-40B4-BE49-F238E27FC236}">
+                <a16:creationId xmlns:a16="http://schemas.microsoft.com/office/drawing/2014/main" id="{8EEB2AFE-5775-EC4A-0996-D5D1834688B0}"/>
+              </a:ext>
+            </a:extLst>
+          </p:cNvPr>
+          <p:cNvPicPr>
+            <a:picLocks noChangeAspect="1"/>
+          </p:cNvPicPr>
+          <p:nvPr/>
+        </p:nvPicPr>
+        <p:blipFill>
+          <a:blip r:embed="rId4"/>
+          <a:stretch>
+            <a:fillRect/>
+          </a:stretch>
+        </p:blipFill>
+        <p:spPr>
+          <a:xfrm>
+            <a:off x="0" y="1"/>
+            <a:ext cx="12192000" cy="6857999"/>
+          </a:xfrm>
+          <a:prstGeom prst="rect">
+            <a:avLst/>
+          </a:prstGeom>
+        </p:spPr>
+      </p:pic>
+      <p:sp>
+        <p:nvSpPr>
+          <p:cNvPr id="2" name="文字方塊 1">
+            <a:extLst>
+              <a:ext uri="{FF2B5EF4-FFF2-40B4-BE49-F238E27FC236}">
+                <a16:creationId xmlns:a16="http://schemas.microsoft.com/office/drawing/2014/main" id="{F2658C2D-EAFE-F72F-6044-041464A77194}"/>
+              </a:ext>
+            </a:extLst>
+          </p:cNvPr>
+          <p:cNvSpPr txBox="1"/>
+          <p:nvPr/>
+        </p:nvSpPr>
+        <p:spPr>
+          <a:xfrm>
+            <a:off x="740214" y="5736900"/>
+            <a:ext cx="1415772" cy="830997"/>
+          </a:xfrm>
+          <a:prstGeom prst="rect">
+            <a:avLst/>
+          </a:prstGeom>
+          <a:noFill/>
+        </p:spPr>
+        <p:txBody>
+          <a:bodyPr wrap="none" rtlCol="0">
+            <a:spAutoFit/>
+          </a:bodyPr>
+          <a:lstStyle/>
+          <a:p>
+            <a:r>
+              <a:rPr lang="zh-TW" altLang="en-US" sz="4800" dirty="0">
+                <a:solidFill>
+                  <a:srgbClr val="BDACD5"/>
+                </a:solidFill>
+                <a:latin typeface="宅在家麥克筆" panose="02020300000000000000" pitchFamily="18" charset="-120"/>
+                <a:ea typeface="宅在家麥克筆" panose="02020300000000000000" pitchFamily="18" charset="-120"/>
+                <a:cs typeface="宅在家麥克筆" panose="02020300000000000000" pitchFamily="18" charset="-120"/>
+              </a:rPr>
+              <a:t>努力</a:t>
+            </a:r>
+          </a:p>
+        </p:txBody>
+      </p:sp>
+    </p:spTree>
+    <p:extLst>
+      <p:ext uri="{BB962C8B-B14F-4D97-AF65-F5344CB8AC3E}">
+        <p14:creationId xmlns:p14="http://schemas.microsoft.com/office/powerpoint/2010/main" val="3919979454"/>
+      </p:ext>
+    </p:extLst>
+  </p:cSld>
+  <p:clrMapOvr>
+    <a:masterClrMapping/>
+  </p:clrMapOvr>
+  <mc:AlternateContent xmlns:mc="http://schemas.openxmlformats.org/markup-compatibility/2006">
+    <mc:Choice xmlns:p159="http://schemas.microsoft.com/office/powerpoint/2015/09/main" Requires="p159">
+      <p:transition xmlns:p14="http://schemas.microsoft.com/office/powerpoint/2010/main" spd="slow" p14:dur="2000">
+        <p159:morph option="byObject"/>
+      </p:transition>
+    </mc:Choice>
+    <mc:Fallback>
+      <p:transition spd="slow">
+        <p:fade/>
+      </p:transition>
+    </mc:Fallback>
+  </mc:AlternateContent>
+</p:sld>
+</file>
+
+<file path=ppt/slides/slide5.xml><?xml version="1.0" encoding="utf-8"?>
+<p:sld xmlns:a="http://schemas.openxmlformats.org/drawingml/2006/main" xmlns:r="http://schemas.openxmlformats.org/officeDocument/2006/relationships" xmlns:p="http://schemas.openxmlformats.org/presentationml/2006/main">
+  <p:cSld>
+    <p:spTree>
+      <p:nvGrpSpPr>
+        <p:cNvPr id="1" name="">
+          <a:extLst>
+            <a:ext uri="{FF2B5EF4-FFF2-40B4-BE49-F238E27FC236}">
+              <a16:creationId xmlns:a16="http://schemas.microsoft.com/office/drawing/2014/main" id="{31662FDA-6EE2-BA93-39C5-1BB2D02B8E66}"/>
+            </a:ext>
+          </a:extLst>
+        </p:cNvPr>
+        <p:cNvGrpSpPr/>
+        <p:nvPr/>
+      </p:nvGrpSpPr>
+      <p:grpSpPr>
+        <a:xfrm>
+          <a:off x="0" y="0"/>
+          <a:ext cx="0" cy="0"/>
+          <a:chOff x="0" y="0"/>
+          <a:chExt cx="0" cy="0"/>
+        </a:xfrm>
+      </p:grpSpPr>
+      <p:pic>
+        <p:nvPicPr>
+          <p:cNvPr id="3" name="圖片 2">
+            <a:extLst>
+              <a:ext uri="{FF2B5EF4-FFF2-40B4-BE49-F238E27FC236}">
+                <a16:creationId xmlns:a16="http://schemas.microsoft.com/office/drawing/2014/main" id="{46F323F8-9A08-C863-1B93-8CA3C0F43333}"/>
+              </a:ext>
+            </a:extLst>
+          </p:cNvPr>
+          <p:cNvPicPr>
+            <a:picLocks noChangeAspect="1"/>
+          </p:cNvPicPr>
+          <p:nvPr/>
+        </p:nvPicPr>
+        <p:blipFill>
+          <a:blip r:embed="rId3"/>
+          <a:srcRect/>
+          <a:stretch/>
+        </p:blipFill>
+        <p:spPr>
+          <a:xfrm>
+            <a:off x="2321278" y="290102"/>
+            <a:ext cx="5264856" cy="5264856"/>
+          </a:xfrm>
+          <a:prstGeom prst="rect">
+            <a:avLst/>
+          </a:prstGeom>
+        </p:spPr>
+      </p:pic>
+      <p:pic>
+        <p:nvPicPr>
+          <p:cNvPr id="12" name="圖片 11">
+            <a:extLst>
+              <a:ext uri="{FF2B5EF4-FFF2-40B4-BE49-F238E27FC236}">
+                <a16:creationId xmlns:a16="http://schemas.microsoft.com/office/drawing/2014/main" id="{4CF9CD14-F811-76A7-E099-292C2B260DBF}"/>
+              </a:ext>
+            </a:extLst>
+          </p:cNvPr>
+          <p:cNvPicPr>
+            <a:picLocks noChangeAspect="1"/>
+          </p:cNvPicPr>
+          <p:nvPr/>
+        </p:nvPicPr>
+        <p:blipFill>
+          <a:blip r:embed="rId4"/>
+          <a:stretch>
+            <a:fillRect/>
+          </a:stretch>
+        </p:blipFill>
+        <p:spPr>
+          <a:xfrm>
+            <a:off x="0" y="1"/>
+            <a:ext cx="12192000" cy="6857999"/>
+          </a:xfrm>
+          <a:prstGeom prst="rect">
+            <a:avLst/>
+          </a:prstGeom>
+        </p:spPr>
+      </p:pic>
+      <p:sp>
+        <p:nvSpPr>
+          <p:cNvPr id="2" name="文字方塊 1">
+            <a:extLst>
+              <a:ext uri="{FF2B5EF4-FFF2-40B4-BE49-F238E27FC236}">
+                <a16:creationId xmlns:a16="http://schemas.microsoft.com/office/drawing/2014/main" id="{E146F7FC-99BF-6BFD-545A-7408D68CDDAA}"/>
+              </a:ext>
+            </a:extLst>
+          </p:cNvPr>
+          <p:cNvSpPr txBox="1"/>
+          <p:nvPr/>
+        </p:nvSpPr>
+        <p:spPr>
+          <a:xfrm>
+            <a:off x="740214" y="5736900"/>
+            <a:ext cx="1415772" cy="830997"/>
+          </a:xfrm>
+          <a:prstGeom prst="rect">
+            <a:avLst/>
+          </a:prstGeom>
+          <a:noFill/>
+        </p:spPr>
+        <p:txBody>
+          <a:bodyPr wrap="none" rtlCol="0">
+            <a:spAutoFit/>
+          </a:bodyPr>
+          <a:lstStyle/>
+          <a:p>
+            <a:r>
+              <a:rPr lang="zh-TW" altLang="en-US" sz="4800" dirty="0">
+                <a:solidFill>
+                  <a:srgbClr val="BDACD5"/>
+                </a:solidFill>
+                <a:latin typeface="宅在家麥克筆" panose="02020300000000000000" pitchFamily="18" charset="-120"/>
+                <a:ea typeface="宅在家麥克筆" panose="02020300000000000000" pitchFamily="18" charset="-120"/>
+                <a:cs typeface="宅在家麥克筆" panose="02020300000000000000" pitchFamily="18" charset="-120"/>
+              </a:rPr>
+              <a:t>結果</a:t>
+            </a:r>
+          </a:p>
+        </p:txBody>
+      </p:sp>
+    </p:spTree>
+    <p:extLst>
+      <p:ext uri="{BB962C8B-B14F-4D97-AF65-F5344CB8AC3E}">
+        <p14:creationId xmlns:p14="http://schemas.microsoft.com/office/powerpoint/2010/main" val="1307455006"/>
+      </p:ext>
+    </p:extLst>
+  </p:cSld>
+  <p:clrMapOvr>
+    <a:masterClrMapping/>
+  </p:clrMapOvr>
+  <mc:AlternateContent xmlns:mc="http://schemas.openxmlformats.org/markup-compatibility/2006">
+    <mc:Choice xmlns:p159="http://schemas.microsoft.com/office/powerpoint/2015/09/main" Requires="p159">
+      <p:transition xmlns:p14="http://schemas.microsoft.com/office/powerpoint/2010/main" spd="slow" p14:dur="2000">
+        <p159:morph option="byObject"/>
+      </p:transition>
+    </mc:Choice>
+    <mc:Fallback>
+      <p:transition spd="slow">
+        <p:fade/>
+      </p:transition>
+    </mc:Fallback>
+  </mc:AlternateContent>
+</p:sld>
+</file>
+
+<file path=ppt/slides/slide6.xml><?xml version="1.0" encoding="utf-8"?>
+<p:sld xmlns:a="http://schemas.openxmlformats.org/drawingml/2006/main" xmlns:r="http://schemas.openxmlformats.org/officeDocument/2006/relationships" xmlns:p="http://schemas.openxmlformats.org/presentationml/2006/main">
+  <p:cSld>
+    <p:spTree>
+      <p:nvGrpSpPr>
+        <p:cNvPr id="1" name="">
+          <a:extLst>
+            <a:ext uri="{FF2B5EF4-FFF2-40B4-BE49-F238E27FC236}">
+              <a16:creationId xmlns:a16="http://schemas.microsoft.com/office/drawing/2014/main" id="{D6DE065F-08B1-A3CD-CF55-C82B5FD05030}"/>
+            </a:ext>
+          </a:extLst>
+        </p:cNvPr>
+        <p:cNvGrpSpPr/>
+        <p:nvPr/>
+      </p:nvGrpSpPr>
+      <p:grpSpPr>
+        <a:xfrm>
+          <a:off x="0" y="0"/>
+          <a:ext cx="0" cy="0"/>
+          <a:chOff x="0" y="0"/>
+          <a:chExt cx="0" cy="0"/>
+        </a:xfrm>
+      </p:grpSpPr>
+      <p:pic>
+        <p:nvPicPr>
+          <p:cNvPr id="3" name="圖片 2">
+            <a:extLst>
+              <a:ext uri="{FF2B5EF4-FFF2-40B4-BE49-F238E27FC236}">
+                <a16:creationId xmlns:a16="http://schemas.microsoft.com/office/drawing/2014/main" id="{9F057F3D-F209-A8C0-7AA9-FDE3ED39B7A0}"/>
+              </a:ext>
+            </a:extLst>
+          </p:cNvPr>
+          <p:cNvPicPr>
+            <a:picLocks noChangeAspect="1"/>
+          </p:cNvPicPr>
+          <p:nvPr/>
+        </p:nvPicPr>
+        <p:blipFill>
+          <a:blip r:embed="rId3"/>
+          <a:srcRect/>
+          <a:stretch/>
+        </p:blipFill>
+        <p:spPr>
+          <a:xfrm>
+            <a:off x="2321278" y="290102"/>
+            <a:ext cx="5264856" cy="5264856"/>
+          </a:xfrm>
+          <a:prstGeom prst="rect">
+            <a:avLst/>
+          </a:prstGeom>
+        </p:spPr>
+      </p:pic>
+      <p:pic>
+        <p:nvPicPr>
+          <p:cNvPr id="12" name="圖片 11">
+            <a:extLst>
+              <a:ext uri="{FF2B5EF4-FFF2-40B4-BE49-F238E27FC236}">
+                <a16:creationId xmlns:a16="http://schemas.microsoft.com/office/drawing/2014/main" id="{757474E6-9725-9EF9-C3D0-696687FB7E5B}"/>
+              </a:ext>
+            </a:extLst>
+          </p:cNvPr>
+          <p:cNvPicPr>
+            <a:picLocks noChangeAspect="1"/>
+          </p:cNvPicPr>
+          <p:nvPr/>
+        </p:nvPicPr>
+        <p:blipFill>
+          <a:blip r:embed="rId4"/>
+          <a:stretch>
+            <a:fillRect/>
+          </a:stretch>
+        </p:blipFill>
+        <p:spPr>
+          <a:xfrm>
+            <a:off x="0" y="1"/>
+            <a:ext cx="12192000" cy="6857999"/>
+          </a:xfrm>
+          <a:prstGeom prst="rect">
+            <a:avLst/>
+          </a:prstGeom>
+        </p:spPr>
+      </p:pic>
+      <p:sp>
+        <p:nvSpPr>
+          <p:cNvPr id="2" name="文字方塊 1">
+            <a:extLst>
+              <a:ext uri="{FF2B5EF4-FFF2-40B4-BE49-F238E27FC236}">
+                <a16:creationId xmlns:a16="http://schemas.microsoft.com/office/drawing/2014/main" id="{80DA01AE-B697-7391-6C32-3CDED960F930}"/>
+              </a:ext>
+            </a:extLst>
+          </p:cNvPr>
+          <p:cNvSpPr txBox="1"/>
+          <p:nvPr/>
+        </p:nvSpPr>
+        <p:spPr>
+          <a:xfrm>
+            <a:off x="740214" y="5736900"/>
+            <a:ext cx="1415772" cy="830997"/>
+          </a:xfrm>
+          <a:prstGeom prst="rect">
+            <a:avLst/>
+          </a:prstGeom>
+          <a:noFill/>
+        </p:spPr>
+        <p:txBody>
+          <a:bodyPr wrap="none" rtlCol="0">
+            <a:spAutoFit/>
+          </a:bodyPr>
+          <a:lstStyle/>
+          <a:p>
+            <a:r>
+              <a:rPr lang="zh-TW" altLang="en-US" sz="4800" dirty="0">
+                <a:solidFill>
+                  <a:srgbClr val="BDACD5"/>
+                </a:solidFill>
+                <a:latin typeface="宅在家麥克筆" panose="02020300000000000000" pitchFamily="18" charset="-120"/>
+                <a:ea typeface="宅在家麥克筆" panose="02020300000000000000" pitchFamily="18" charset="-120"/>
+                <a:cs typeface="宅在家麥克筆" panose="02020300000000000000" pitchFamily="18" charset="-120"/>
+              </a:rPr>
+              <a:t>意外</a:t>
+            </a:r>
+          </a:p>
+        </p:txBody>
+      </p:sp>
+    </p:spTree>
+    <p:extLst>
+      <p:ext uri="{BB962C8B-B14F-4D97-AF65-F5344CB8AC3E}">
+        <p14:creationId xmlns:p14="http://schemas.microsoft.com/office/powerpoint/2010/main" val="2817758109"/>
+      </p:ext>
+    </p:extLst>
+  </p:cSld>
+  <p:clrMapOvr>
+    <a:masterClrMapping/>
+  </p:clrMapOvr>
+  <mc:AlternateContent xmlns:mc="http://schemas.openxmlformats.org/markup-compatibility/2006">
+    <mc:Choice xmlns:p159="http://schemas.microsoft.com/office/powerpoint/2015/09/main" Requires="p159">
+      <p:transition xmlns:p14="http://schemas.microsoft.com/office/powerpoint/2010/main" spd="slow" p14:dur="2000">
+        <p159:morph option="byObject"/>
+      </p:transition>
+    </mc:Choice>
+    <mc:Fallback>
+      <p:transition spd="slow">
+        <p:fade/>
+      </p:transition>
+    </mc:Fallback>
+  </mc:AlternateContent>
+</p:sld>
+</file>
+
+<file path=ppt/slides/slide7.xml><?xml version="1.0" encoding="utf-8"?>
+<p:sld xmlns:a="http://schemas.openxmlformats.org/drawingml/2006/main" xmlns:r="http://schemas.openxmlformats.org/officeDocument/2006/relationships" xmlns:p="http://schemas.openxmlformats.org/presentationml/2006/main">
+  <p:cSld>
+    <p:spTree>
+      <p:nvGrpSpPr>
+        <p:cNvPr id="1" name="">
+          <a:extLst>
+            <a:ext uri="{FF2B5EF4-FFF2-40B4-BE49-F238E27FC236}">
+              <a16:creationId xmlns:a16="http://schemas.microsoft.com/office/drawing/2014/main" id="{2222CD43-FFCD-C466-34A2-0A37390D253E}"/>
+            </a:ext>
+          </a:extLst>
+        </p:cNvPr>
+        <p:cNvGrpSpPr/>
+        <p:nvPr/>
+      </p:nvGrpSpPr>
+      <p:grpSpPr>
+        <a:xfrm>
+          <a:off x="0" y="0"/>
+          <a:ext cx="0" cy="0"/>
+          <a:chOff x="0" y="0"/>
+          <a:chExt cx="0" cy="0"/>
+        </a:xfrm>
+      </p:grpSpPr>
+      <p:pic>
+        <p:nvPicPr>
+          <p:cNvPr id="3" name="圖片 2">
+            <a:extLst>
+              <a:ext uri="{FF2B5EF4-FFF2-40B4-BE49-F238E27FC236}">
+                <a16:creationId xmlns:a16="http://schemas.microsoft.com/office/drawing/2014/main" id="{878E296C-BC84-13AE-E91D-3AF4B1885010}"/>
+              </a:ext>
+            </a:extLst>
+          </p:cNvPr>
+          <p:cNvPicPr>
+            <a:picLocks noChangeAspect="1"/>
+          </p:cNvPicPr>
+          <p:nvPr/>
+        </p:nvPicPr>
+        <p:blipFill>
+          <a:blip r:embed="rId3"/>
+          <a:srcRect/>
+          <a:stretch/>
+        </p:blipFill>
+        <p:spPr>
+          <a:xfrm>
+            <a:off x="2321278" y="290102"/>
+            <a:ext cx="5264856" cy="5264856"/>
+          </a:xfrm>
+          <a:prstGeom prst="rect">
+            <a:avLst/>
+          </a:prstGeom>
+        </p:spPr>
+      </p:pic>
+      <p:pic>
+        <p:nvPicPr>
+          <p:cNvPr id="12" name="圖片 11">
+            <a:extLst>
+              <a:ext uri="{FF2B5EF4-FFF2-40B4-BE49-F238E27FC236}">
+                <a16:creationId xmlns:a16="http://schemas.microsoft.com/office/drawing/2014/main" id="{BC52E14E-8CBD-BEB7-024C-F5C4631B1724}"/>
+              </a:ext>
+            </a:extLst>
+          </p:cNvPr>
+          <p:cNvPicPr>
+            <a:picLocks noChangeAspect="1"/>
+          </p:cNvPicPr>
+          <p:nvPr/>
+        </p:nvPicPr>
+        <p:blipFill>
+          <a:blip r:embed="rId4"/>
+          <a:stretch>
+            <a:fillRect/>
+          </a:stretch>
+        </p:blipFill>
+        <p:spPr>
+          <a:xfrm>
+            <a:off x="0" y="1"/>
+            <a:ext cx="12192000" cy="6857999"/>
+          </a:xfrm>
+          <a:prstGeom prst="rect">
+            <a:avLst/>
+          </a:prstGeom>
+        </p:spPr>
+      </p:pic>
+      <p:sp>
+        <p:nvSpPr>
+          <p:cNvPr id="2" name="文字方塊 1">
+            <a:extLst>
+              <a:ext uri="{FF2B5EF4-FFF2-40B4-BE49-F238E27FC236}">
+                <a16:creationId xmlns:a16="http://schemas.microsoft.com/office/drawing/2014/main" id="{5D6B0C61-00E2-5047-D47A-391DEDD3F08D}"/>
+              </a:ext>
+            </a:extLst>
+          </p:cNvPr>
+          <p:cNvSpPr txBox="1"/>
+          <p:nvPr/>
+        </p:nvSpPr>
+        <p:spPr>
+          <a:xfrm>
+            <a:off x="740214" y="5736900"/>
+            <a:ext cx="1415772" cy="830997"/>
+          </a:xfrm>
+          <a:prstGeom prst="rect">
+            <a:avLst/>
+          </a:prstGeom>
+          <a:noFill/>
+        </p:spPr>
+        <p:txBody>
+          <a:bodyPr wrap="none" rtlCol="0">
+            <a:spAutoFit/>
+          </a:bodyPr>
+          <a:lstStyle/>
+          <a:p>
+            <a:r>
+              <a:rPr lang="zh-TW" altLang="en-US" sz="4800" dirty="0">
+                <a:solidFill>
+                  <a:srgbClr val="BDACD5"/>
+                </a:solidFill>
+                <a:latin typeface="宅在家麥克筆" panose="02020300000000000000" pitchFamily="18" charset="-120"/>
+                <a:ea typeface="宅在家麥克筆" panose="02020300000000000000" pitchFamily="18" charset="-120"/>
+                <a:cs typeface="宅在家麥克筆" panose="02020300000000000000" pitchFamily="18" charset="-120"/>
+              </a:rPr>
+              <a:t>轉彎</a:t>
+            </a:r>
+          </a:p>
+        </p:txBody>
+      </p:sp>
+    </p:spTree>
+    <p:extLst>
+      <p:ext uri="{BB962C8B-B14F-4D97-AF65-F5344CB8AC3E}">
+        <p14:creationId xmlns:p14="http://schemas.microsoft.com/office/powerpoint/2010/main" val="3554184782"/>
+      </p:ext>
+    </p:extLst>
+  </p:cSld>
+  <p:clrMapOvr>
+    <a:masterClrMapping/>
+  </p:clrMapOvr>
+  <mc:AlternateContent xmlns:mc="http://schemas.openxmlformats.org/markup-compatibility/2006">
+    <mc:Choice xmlns:p159="http://schemas.microsoft.com/office/powerpoint/2015/09/main" Requires="p159">
+      <p:transition xmlns:p14="http://schemas.microsoft.com/office/powerpoint/2010/main" spd="slow" p14:dur="2000">
+        <p159:morph option="byObject"/>
+      </p:transition>
+    </mc:Choice>
+    <mc:Fallback>
+      <p:transition spd="slow">
+        <p:fade/>
+      </p:transition>
+    </mc:Fallback>
+  </mc:AlternateContent>
+</p:sld>
+</file>
+
+<file path=ppt/slides/slide8.xml><?xml version="1.0" encoding="utf-8"?>
+<p:sld xmlns:a="http://schemas.openxmlformats.org/drawingml/2006/main" xmlns:r="http://schemas.openxmlformats.org/officeDocument/2006/relationships" xmlns:p="http://schemas.openxmlformats.org/presentationml/2006/main">
+  <p:cSld>
+    <p:spTree>
+      <p:nvGrpSpPr>
+        <p:cNvPr id="1" name="">
+          <a:extLst>
+            <a:ext uri="{FF2B5EF4-FFF2-40B4-BE49-F238E27FC236}">
+              <a16:creationId xmlns:a16="http://schemas.microsoft.com/office/drawing/2014/main" id="{BF28B26D-5781-8463-B8C6-B6D6FB1E5BBE}"/>
+            </a:ext>
+          </a:extLst>
+        </p:cNvPr>
+        <p:cNvGrpSpPr/>
+        <p:nvPr/>
+      </p:nvGrpSpPr>
+      <p:grpSpPr>
+        <a:xfrm>
+          <a:off x="0" y="0"/>
+          <a:ext cx="0" cy="0"/>
+          <a:chOff x="0" y="0"/>
+          <a:chExt cx="0" cy="0"/>
+        </a:xfrm>
+      </p:grpSpPr>
+      <p:pic>
+        <p:nvPicPr>
+          <p:cNvPr id="3" name="圖片 2">
+            <a:extLst>
+              <a:ext uri="{FF2B5EF4-FFF2-40B4-BE49-F238E27FC236}">
+                <a16:creationId xmlns:a16="http://schemas.microsoft.com/office/drawing/2014/main" id="{01B21024-CA38-3582-002F-A7CCC7E7F539}"/>
+              </a:ext>
+            </a:extLst>
+          </p:cNvPr>
+          <p:cNvPicPr>
+            <a:picLocks noChangeAspect="1"/>
+          </p:cNvPicPr>
+          <p:nvPr/>
+        </p:nvPicPr>
+        <p:blipFill>
+          <a:blip r:embed="rId3"/>
+          <a:srcRect/>
+          <a:stretch/>
+        </p:blipFill>
+        <p:spPr>
+          <a:xfrm>
+            <a:off x="2321278" y="290102"/>
+            <a:ext cx="5264856" cy="5264856"/>
+          </a:xfrm>
+          <a:prstGeom prst="rect">
+            <a:avLst/>
+          </a:prstGeom>
+        </p:spPr>
+      </p:pic>
+      <p:pic>
+        <p:nvPicPr>
+          <p:cNvPr id="12" name="圖片 11">
+            <a:extLst>
+              <a:ext uri="{FF2B5EF4-FFF2-40B4-BE49-F238E27FC236}">
+                <a16:creationId xmlns:a16="http://schemas.microsoft.com/office/drawing/2014/main" id="{B0210FEA-C93D-587C-DBD1-AAD083EDB691}"/>
+              </a:ext>
+            </a:extLst>
+          </p:cNvPr>
+          <p:cNvPicPr>
+            <a:picLocks noChangeAspect="1"/>
+          </p:cNvPicPr>
+          <p:nvPr/>
+        </p:nvPicPr>
+        <p:blipFill>
+          <a:blip r:embed="rId4"/>
+          <a:stretch>
+            <a:fillRect/>
+          </a:stretch>
+        </p:blipFill>
+        <p:spPr>
+          <a:xfrm>
+            <a:off x="0" y="1"/>
+            <a:ext cx="12192000" cy="6857999"/>
+          </a:xfrm>
+          <a:prstGeom prst="rect">
+            <a:avLst/>
+          </a:prstGeom>
+        </p:spPr>
+      </p:pic>
+      <p:sp>
+        <p:nvSpPr>
+          <p:cNvPr id="2" name="文字方塊 1">
+            <a:extLst>
+              <a:ext uri="{FF2B5EF4-FFF2-40B4-BE49-F238E27FC236}">
+                <a16:creationId xmlns:a16="http://schemas.microsoft.com/office/drawing/2014/main" id="{F9D95EDC-604F-C347-3B83-CC6B8A3F544F}"/>
+              </a:ext>
+            </a:extLst>
+          </p:cNvPr>
+          <p:cNvSpPr txBox="1"/>
+          <p:nvPr/>
+        </p:nvSpPr>
+        <p:spPr>
+          <a:xfrm>
+            <a:off x="740214" y="5736900"/>
+            <a:ext cx="1415772" cy="830997"/>
+          </a:xfrm>
+          <a:prstGeom prst="rect">
+            <a:avLst/>
+          </a:prstGeom>
+          <a:noFill/>
+        </p:spPr>
+        <p:txBody>
+          <a:bodyPr wrap="none" rtlCol="0">
+            <a:spAutoFit/>
+          </a:bodyPr>
+          <a:lstStyle/>
+          <a:p>
+            <a:r>
+              <a:rPr lang="zh-TW" altLang="en-US" sz="4800" dirty="0">
+                <a:solidFill>
+                  <a:srgbClr val="BDACD5"/>
+                </a:solidFill>
+                <a:latin typeface="宅在家麥克筆" panose="02020300000000000000" pitchFamily="18" charset="-120"/>
+                <a:ea typeface="宅在家麥克筆" panose="02020300000000000000" pitchFamily="18" charset="-120"/>
+                <a:cs typeface="宅在家麥克筆" panose="02020300000000000000" pitchFamily="18" charset="-120"/>
+              </a:rPr>
+              <a:t>結局</a:t>
+            </a:r>
+          </a:p>
+        </p:txBody>
+      </p:sp>
+    </p:spTree>
+    <p:extLst>
+      <p:ext uri="{BB962C8B-B14F-4D97-AF65-F5344CB8AC3E}">
+        <p14:creationId xmlns:p14="http://schemas.microsoft.com/office/powerpoint/2010/main" val="3283585565"/>
+      </p:ext>
+    </p:extLst>
+  </p:cSld>
+  <p:clrMapOvr>
+    <a:masterClrMapping/>
+  </p:clrMapOvr>
+  <mc:AlternateContent xmlns:mc="http://schemas.openxmlformats.org/markup-compatibility/2006">
+    <mc:Choice xmlns:p159="http://schemas.microsoft.com/office/powerpoint/2015/09/main" Requires="p159">
+      <p:transition xmlns:p14="http://schemas.microsoft.com/office/powerpoint/2010/main" spd="slow" p14:dur="2000">
+        <p159:morph option="byObject"/>
+      </p:transition>
+    </mc:Choice>
+    <mc:Fallback>
+      <p:transition spd="slow">
+        <p:fade/>
+      </p:transition>
+    </mc:Fallback>
+  </mc:AlternateContent>
 </p:sld>
 </file>
 
@@ -3677,4 +6014,299 @@
     </a:ext>
   </a:extLst>
 </a:theme>
+</file>
+
+<file path=ppt/theme/theme2.xml><?xml version="1.0" encoding="utf-8"?>
+<a:theme xmlns:a="http://schemas.openxmlformats.org/drawingml/2006/main" name="Office 佈景主題">
+  <a:themeElements>
+    <a:clrScheme name="Office">
+      <a:dk1>
+        <a:sysClr val="windowText" lastClr="000000"/>
+      </a:dk1>
+      <a:lt1>
+        <a:sysClr val="window" lastClr="FFFFFF"/>
+      </a:lt1>
+      <a:dk2>
+        <a:srgbClr val="44546A"/>
+      </a:dk2>
+      <a:lt2>
+        <a:srgbClr val="E7E6E6"/>
+      </a:lt2>
+      <a:accent1>
+        <a:srgbClr val="4472C4"/>
+      </a:accent1>
+      <a:accent2>
+        <a:srgbClr val="ED7D31"/>
+      </a:accent2>
+      <a:accent3>
+        <a:srgbClr val="A5A5A5"/>
+      </a:accent3>
+      <a:accent4>
+        <a:srgbClr val="FFC000"/>
+      </a:accent4>
+      <a:accent5>
+        <a:srgbClr val="5B9BD5"/>
+      </a:accent5>
+      <a:accent6>
+        <a:srgbClr val="70AD47"/>
+      </a:accent6>
+      <a:hlink>
+        <a:srgbClr val="0563C1"/>
+      </a:hlink>
+      <a:folHlink>
+        <a:srgbClr val="954F72"/>
+      </a:folHlink>
+    </a:clrScheme>
+    <a:fontScheme name="Office">
+      <a:majorFont>
+        <a:latin typeface="Calibri Light" panose="020F0302020204030204"/>
+        <a:ea typeface=""/>
+        <a:cs typeface=""/>
+        <a:font script="Jpan" typeface="游ゴシック Light"/>
+        <a:font script="Hang" typeface="맑은 고딕"/>
+        <a:font script="Hans" typeface="等线 Light"/>
+        <a:font script="Hant" typeface="新細明體"/>
+        <a:font script="Arab" typeface="Times New Roman"/>
+        <a:font script="Hebr" typeface="Times New Roman"/>
+        <a:font script="Thai" typeface="Angsana New"/>
+        <a:font script="Ethi" typeface="Nyala"/>
+        <a:font script="Beng" typeface="Vrinda"/>
+        <a:font script="Gujr" typeface="Shruti"/>
+        <a:font script="Khmr" typeface="MoolBoran"/>
+        <a:font script="Knda" typeface="Tunga"/>
+        <a:font script="Guru" typeface="Raavi"/>
+        <a:font script="Cans" typeface="Euphemia"/>
+        <a:font script="Cher" typeface="Plantagenet Cherokee"/>
+        <a:font script="Yiii" typeface="Microsoft Yi Baiti"/>
+        <a:font script="Tibt" typeface="Microsoft Himalaya"/>
+        <a:font script="Thaa" typeface="MV Boli"/>
+        <a:font script="Deva" typeface="Mangal"/>
+        <a:font script="Telu" typeface="Gautami"/>
+        <a:font script="Taml" typeface="Latha"/>
+        <a:font script="Syrc" typeface="Estrangelo Edessa"/>
+        <a:font script="Orya" typeface="Kalinga"/>
+        <a:font script="Mlym" typeface="Kartika"/>
+        <a:font script="Laoo" typeface="DokChampa"/>
+        <a:font script="Sinh" typeface="Iskoola Pota"/>
+        <a:font script="Mong" typeface="Mongolian Baiti"/>
+        <a:font script="Viet" typeface="Times New Roman"/>
+        <a:font script="Uigh" typeface="Microsoft Uighur"/>
+        <a:font script="Geor" typeface="Sylfaen"/>
+        <a:font script="Armn" typeface="Arial"/>
+        <a:font script="Bugi" typeface="Leelawadee UI"/>
+        <a:font script="Bopo" typeface="Microsoft JhengHei"/>
+        <a:font script="Java" typeface="Javanese Text"/>
+        <a:font script="Lisu" typeface="Segoe UI"/>
+        <a:font script="Mymr" typeface="Myanmar Text"/>
+        <a:font script="Nkoo" typeface="Ebrima"/>
+        <a:font script="Olck" typeface="Nirmala UI"/>
+        <a:font script="Osma" typeface="Ebrima"/>
+        <a:font script="Phag" typeface="Phagspa"/>
+        <a:font script="Syrn" typeface="Estrangelo Edessa"/>
+        <a:font script="Syrj" typeface="Estrangelo Edessa"/>
+        <a:font script="Syre" typeface="Estrangelo Edessa"/>
+        <a:font script="Sora" typeface="Nirmala UI"/>
+        <a:font script="Tale" typeface="Microsoft Tai Le"/>
+        <a:font script="Talu" typeface="Microsoft New Tai Lue"/>
+        <a:font script="Tfng" typeface="Ebrima"/>
+      </a:majorFont>
+      <a:minorFont>
+        <a:latin typeface="Calibri" panose="020F0502020204030204"/>
+        <a:ea typeface=""/>
+        <a:cs typeface=""/>
+        <a:font script="Jpan" typeface="游ゴシック"/>
+        <a:font script="Hang" typeface="맑은 고딕"/>
+        <a:font script="Hans" typeface="等线"/>
+        <a:font script="Hant" typeface="新細明體"/>
+        <a:font script="Arab" typeface="Arial"/>
+        <a:font script="Hebr" typeface="Arial"/>
+        <a:font script="Thai" typeface="Cordia New"/>
+        <a:font script="Ethi" typeface="Nyala"/>
+        <a:font script="Beng" typeface="Vrinda"/>
+        <a:font script="Gujr" typeface="Shruti"/>
+        <a:font script="Khmr" typeface="DaunPenh"/>
+        <a:font script="Knda" typeface="Tunga"/>
+        <a:font script="Guru" typeface="Raavi"/>
+        <a:font script="Cans" typeface="Euphemia"/>
+        <a:font script="Cher" typeface="Plantagenet Cherokee"/>
+        <a:font script="Yiii" typeface="Microsoft Yi Baiti"/>
+        <a:font script="Tibt" typeface="Microsoft Himalaya"/>
+        <a:font script="Thaa" typeface="MV Boli"/>
+        <a:font script="Deva" typeface="Mangal"/>
+        <a:font script="Telu" typeface="Gautami"/>
+        <a:font script="Taml" typeface="Latha"/>
+        <a:font script="Syrc" typeface="Estrangelo Edessa"/>
+        <a:font script="Orya" typeface="Kalinga"/>
+        <a:font script="Mlym" typeface="Kartika"/>
+        <a:font script="Laoo" typeface="DokChampa"/>
+        <a:font script="Sinh" typeface="Iskoola Pota"/>
+        <a:font script="Mong" typeface="Mongolian Baiti"/>
+        <a:font script="Viet" typeface="Arial"/>
+        <a:font script="Uigh" typeface="Microsoft Uighur"/>
+        <a:font script="Geor" typeface="Sylfaen"/>
+        <a:font script="Armn" typeface="Arial"/>
+        <a:font script="Bugi" typeface="Leelawadee UI"/>
+        <a:font script="Bopo" typeface="Microsoft JhengHei"/>
+        <a:font script="Java" typeface="Javanese Text"/>
+        <a:font script="Lisu" typeface="Segoe UI"/>
+        <a:font script="Mymr" typeface="Myanmar Text"/>
+        <a:font script="Nkoo" typeface="Ebrima"/>
+        <a:font script="Olck" typeface="Nirmala UI"/>
+        <a:font script="Osma" typeface="Ebrima"/>
+        <a:font script="Phag" typeface="Phagspa"/>
+        <a:font script="Syrn" typeface="Estrangelo Edessa"/>
+        <a:font script="Syrj" typeface="Estrangelo Edessa"/>
+        <a:font script="Syre" typeface="Estrangelo Edessa"/>
+        <a:font script="Sora" typeface="Nirmala UI"/>
+        <a:font script="Tale" typeface="Microsoft Tai Le"/>
+        <a:font script="Talu" typeface="Microsoft New Tai Lue"/>
+        <a:font script="Tfng" typeface="Ebrima"/>
+      </a:minorFont>
+    </a:fontScheme>
+    <a:fmtScheme name="Office">
+      <a:fillStyleLst>
+        <a:solidFill>
+          <a:schemeClr val="phClr"/>
+        </a:solidFill>
+        <a:gradFill rotWithShape="1">
+          <a:gsLst>
+            <a:gs pos="0">
+              <a:schemeClr val="phClr">
+                <a:lumMod val="110000"/>
+                <a:satMod val="105000"/>
+                <a:tint val="67000"/>
+              </a:schemeClr>
+            </a:gs>
+            <a:gs pos="50000">
+              <a:schemeClr val="phClr">
+                <a:lumMod val="105000"/>
+                <a:satMod val="103000"/>
+                <a:tint val="73000"/>
+              </a:schemeClr>
+            </a:gs>
+            <a:gs pos="100000">
+              <a:schemeClr val="phClr">
+                <a:lumMod val="105000"/>
+                <a:satMod val="109000"/>
+                <a:tint val="81000"/>
+              </a:schemeClr>
+            </a:gs>
+          </a:gsLst>
+          <a:lin ang="5400000" scaled="0"/>
+        </a:gradFill>
+        <a:gradFill rotWithShape="1">
+          <a:gsLst>
+            <a:gs pos="0">
+              <a:schemeClr val="phClr">
+                <a:satMod val="103000"/>
+                <a:lumMod val="102000"/>
+                <a:tint val="94000"/>
+              </a:schemeClr>
+            </a:gs>
+            <a:gs pos="50000">
+              <a:schemeClr val="phClr">
+                <a:satMod val="110000"/>
+                <a:lumMod val="100000"/>
+                <a:shade val="100000"/>
+              </a:schemeClr>
+            </a:gs>
+            <a:gs pos="100000">
+              <a:schemeClr val="phClr">
+                <a:lumMod val="99000"/>
+                <a:satMod val="120000"/>
+                <a:shade val="78000"/>
+              </a:schemeClr>
+            </a:gs>
+          </a:gsLst>
+          <a:lin ang="5400000" scaled="0"/>
+        </a:gradFill>
+      </a:fillStyleLst>
+      <a:lnStyleLst>
+        <a:ln w="6350" cap="flat" cmpd="sng" algn="ctr">
+          <a:solidFill>
+            <a:schemeClr val="phClr"/>
+          </a:solidFill>
+          <a:prstDash val="solid"/>
+          <a:miter lim="800000"/>
+        </a:ln>
+        <a:ln w="12700" cap="flat" cmpd="sng" algn="ctr">
+          <a:solidFill>
+            <a:schemeClr val="phClr"/>
+          </a:solidFill>
+          <a:prstDash val="solid"/>
+          <a:miter lim="800000"/>
+        </a:ln>
+        <a:ln w="19050" cap="flat" cmpd="sng" algn="ctr">
+          <a:solidFill>
+            <a:schemeClr val="phClr"/>
+          </a:solidFill>
+          <a:prstDash val="solid"/>
+          <a:miter lim="800000"/>
+        </a:ln>
+      </a:lnStyleLst>
+      <a:effectStyleLst>
+        <a:effectStyle>
+          <a:effectLst/>
+        </a:effectStyle>
+        <a:effectStyle>
+          <a:effectLst/>
+        </a:effectStyle>
+        <a:effectStyle>
+          <a:effectLst>
+            <a:outerShdw blurRad="57150" dist="19050" dir="5400000" algn="ctr" rotWithShape="0">
+              <a:srgbClr val="000000">
+                <a:alpha val="63000"/>
+              </a:srgbClr>
+            </a:outerShdw>
+          </a:effectLst>
+        </a:effectStyle>
+      </a:effectStyleLst>
+      <a:bgFillStyleLst>
+        <a:solidFill>
+          <a:schemeClr val="phClr"/>
+        </a:solidFill>
+        <a:solidFill>
+          <a:schemeClr val="phClr">
+            <a:tint val="95000"/>
+            <a:satMod val="170000"/>
+          </a:schemeClr>
+        </a:solidFill>
+        <a:gradFill rotWithShape="1">
+          <a:gsLst>
+            <a:gs pos="0">
+              <a:schemeClr val="phClr">
+                <a:tint val="93000"/>
+                <a:satMod val="150000"/>
+                <a:shade val="98000"/>
+                <a:lumMod val="102000"/>
+              </a:schemeClr>
+            </a:gs>
+            <a:gs pos="50000">
+              <a:schemeClr val="phClr">
+                <a:tint val="98000"/>
+                <a:satMod val="130000"/>
+                <a:shade val="90000"/>
+                <a:lumMod val="103000"/>
+              </a:schemeClr>
+            </a:gs>
+            <a:gs pos="100000">
+              <a:schemeClr val="phClr">
+                <a:shade val="63000"/>
+                <a:satMod val="120000"/>
+              </a:schemeClr>
+            </a:gs>
+          </a:gsLst>
+          <a:lin ang="5400000" scaled="0"/>
+        </a:gradFill>
+      </a:bgFillStyleLst>
+    </a:fmtScheme>
+  </a:themeElements>
+  <a:objectDefaults/>
+  <a:extraClrSchemeLst/>
+  <a:extLst>
+    <a:ext uri="{05A4C25C-085E-4340-85A3-A5531E510DB2}">
+      <thm15:themeFamily xmlns:thm15="http://schemas.microsoft.com/office/thememl/2012/main" name="Office Theme" id="{62F939B6-93AF-4DB8-9C6B-D6C7DFDC589F}" vid="{4A3C46E8-61CC-4603-A589-7422A47A8E4A}"/>
+    </a:ext>
+  </a:extLst>
+</a:theme>
 </file>
</xml_diff>